<commit_message>
Har skrevet mere til PID crap
</commit_message>
<xml_diff>
--- a/Documents/Rapport/Figurer/Figurer.pptx
+++ b/Documents/Rapport/Figurer/Figurer.pptx
@@ -7,6 +7,7 @@
   <p:sldIdLst>
     <p:sldId id="256" r:id="rId2"/>
     <p:sldId id="257" r:id="rId3"/>
+    <p:sldId id="258" r:id="rId4"/>
   </p:sldIdLst>
   <p:sldSz cx="12192000" cy="6858000"/>
   <p:notesSz cx="6858000" cy="9144000"/>
@@ -3541,19 +3542,17 @@
           </a:prstGeom>
         </p:spPr>
         <p:style>
-          <a:lnRef idx="2">
-            <a:schemeClr val="accent1">
-              <a:shade val="50000"/>
-            </a:schemeClr>
+          <a:lnRef idx="1">
+            <a:schemeClr val="accent1"/>
           </a:lnRef>
-          <a:fillRef idx="1">
+          <a:fillRef idx="2">
             <a:schemeClr val="accent1"/>
           </a:fillRef>
-          <a:effectRef idx="0">
+          <a:effectRef idx="1">
             <a:schemeClr val="accent1"/>
           </a:effectRef>
           <a:fontRef idx="minor">
-            <a:schemeClr val="lt1"/>
+            <a:schemeClr val="dk1"/>
           </a:fontRef>
         </p:style>
         <p:txBody>
@@ -3592,19 +3591,17 @@
           </a:prstGeom>
         </p:spPr>
         <p:style>
-          <a:lnRef idx="2">
-            <a:schemeClr val="accent1">
-              <a:shade val="50000"/>
-            </a:schemeClr>
+          <a:lnRef idx="1">
+            <a:schemeClr val="accent1"/>
           </a:lnRef>
-          <a:fillRef idx="1">
+          <a:fillRef idx="2">
             <a:schemeClr val="accent1"/>
           </a:fillRef>
-          <a:effectRef idx="0">
+          <a:effectRef idx="1">
             <a:schemeClr val="accent1"/>
           </a:effectRef>
           <a:fontRef idx="minor">
-            <a:schemeClr val="lt1"/>
+            <a:schemeClr val="dk1"/>
           </a:fontRef>
         </p:style>
         <p:txBody>
@@ -3643,19 +3640,17 @@
           </a:prstGeom>
         </p:spPr>
         <p:style>
-          <a:lnRef idx="2">
-            <a:schemeClr val="accent1">
-              <a:shade val="50000"/>
-            </a:schemeClr>
+          <a:lnRef idx="1">
+            <a:schemeClr val="accent1"/>
           </a:lnRef>
-          <a:fillRef idx="1">
+          <a:fillRef idx="2">
             <a:schemeClr val="accent1"/>
           </a:fillRef>
-          <a:effectRef idx="0">
+          <a:effectRef idx="1">
             <a:schemeClr val="accent1"/>
           </a:effectRef>
           <a:fontRef idx="minor">
-            <a:schemeClr val="lt1"/>
+            <a:schemeClr val="dk1"/>
           </a:fontRef>
         </p:style>
         <p:txBody>
@@ -3867,17 +3862,17 @@
           </a:prstGeom>
         </p:spPr>
         <p:style>
-          <a:lnRef idx="3">
-            <a:schemeClr val="lt1"/>
+          <a:lnRef idx="1">
+            <a:schemeClr val="accent6"/>
           </a:lnRef>
-          <a:fillRef idx="1">
+          <a:fillRef idx="2">
             <a:schemeClr val="accent6"/>
           </a:fillRef>
           <a:effectRef idx="1">
             <a:schemeClr val="accent6"/>
           </a:effectRef>
           <a:fontRef idx="minor">
-            <a:schemeClr val="lt1"/>
+            <a:schemeClr val="dk1"/>
           </a:fontRef>
         </p:style>
         <p:txBody>
@@ -3916,17 +3911,17 @@
           </a:prstGeom>
         </p:spPr>
         <p:style>
-          <a:lnRef idx="3">
-            <a:schemeClr val="lt1"/>
+          <a:lnRef idx="1">
+            <a:schemeClr val="accent6"/>
           </a:lnRef>
-          <a:fillRef idx="1">
+          <a:fillRef idx="2">
             <a:schemeClr val="accent6"/>
           </a:fillRef>
           <a:effectRef idx="1">
             <a:schemeClr val="accent6"/>
           </a:effectRef>
           <a:fontRef idx="minor">
-            <a:schemeClr val="lt1"/>
+            <a:schemeClr val="dk1"/>
           </a:fontRef>
         </p:style>
         <p:txBody>
@@ -4103,7 +4098,6 @@
               <a:gd name="adj" fmla="val 15399"/>
             </a:avLst>
           </a:prstGeom>
-          <a:effectLst/>
         </p:spPr>
         <p:style>
           <a:lnRef idx="1">
@@ -4148,7 +4142,6 @@
               <a:gd name="adj" fmla="val 15399"/>
             </a:avLst>
           </a:prstGeom>
-          <a:effectLst/>
         </p:spPr>
         <p:style>
           <a:lnRef idx="1">
@@ -4193,7 +4186,6 @@
               <a:gd name="adj" fmla="val 15399"/>
             </a:avLst>
           </a:prstGeom>
-          <a:effectLst/>
         </p:spPr>
         <p:style>
           <a:lnRef idx="1">
@@ -4400,6 +4392,1826 @@
     <p:extLst>
       <p:ext uri="{BB962C8B-B14F-4D97-AF65-F5344CB8AC3E}">
         <p14:creationId xmlns:p14="http://schemas.microsoft.com/office/powerpoint/2010/main" val="598806973"/>
+      </p:ext>
+    </p:extLst>
+  </p:cSld>
+  <p:clrMapOvr>
+    <a:masterClrMapping/>
+  </p:clrMapOvr>
+</p:sld>
+</file>
+
+<file path=ppt/slides/slide3.xml><?xml version="1.0" encoding="utf-8"?>
+<p:sld xmlns:a="http://schemas.openxmlformats.org/drawingml/2006/main" xmlns:r="http://schemas.openxmlformats.org/officeDocument/2006/relationships" xmlns:p="http://schemas.openxmlformats.org/presentationml/2006/main">
+  <p:cSld>
+    <p:spTree>
+      <p:nvGrpSpPr>
+        <p:cNvPr id="1" name=""/>
+        <p:cNvGrpSpPr/>
+        <p:nvPr/>
+      </p:nvGrpSpPr>
+      <p:grpSpPr>
+        <a:xfrm>
+          <a:off x="0" y="0"/>
+          <a:ext cx="0" cy="0"/>
+          <a:chOff x="0" y="0"/>
+          <a:chExt cx="0" cy="0"/>
+        </a:xfrm>
+      </p:grpSpPr>
+      <mc:AlternateContent xmlns:mc="http://schemas.openxmlformats.org/markup-compatibility/2006">
+        <mc:Choice xmlns:a14="http://schemas.microsoft.com/office/drawing/2010/main" Requires="a14">
+          <p:sp>
+            <p:nvSpPr>
+              <p:cNvPr id="4" name="Rektangel 3"/>
+              <p:cNvSpPr/>
+              <p:nvPr/>
+            </p:nvSpPr>
+            <p:spPr>
+              <a:xfrm>
+                <a:off x="6153667" y="1326290"/>
+                <a:ext cx="1243913" cy="922638"/>
+              </a:xfrm>
+              <a:prstGeom prst="rect">
+                <a:avLst/>
+              </a:prstGeom>
+            </p:spPr>
+            <p:style>
+              <a:lnRef idx="1">
+                <a:schemeClr val="dk1"/>
+              </a:lnRef>
+              <a:fillRef idx="2">
+                <a:schemeClr val="dk1"/>
+              </a:fillRef>
+              <a:effectRef idx="1">
+                <a:schemeClr val="dk1"/>
+              </a:effectRef>
+              <a:fontRef idx="minor">
+                <a:schemeClr val="dk1"/>
+              </a:fontRef>
+            </p:style>
+            <p:txBody>
+              <a:bodyPr rtlCol="0" anchor="ctr"/>
+              <a:lstStyle/>
+              <a:p>
+                <a:pPr algn="ctr"/>
+                <a14:m>
+                  <m:oMathPara xmlns:m="http://schemas.openxmlformats.org/officeDocument/2006/math">
+                    <m:oMathParaPr>
+                      <m:jc m:val="centerGroup"/>
+                    </m:oMathParaPr>
+                    <m:oMath xmlns:m="http://schemas.openxmlformats.org/officeDocument/2006/math">
+                      <m:f>
+                        <m:fPr>
+                          <m:ctrlPr>
+                            <a:rPr lang="en-US" i="1" smtClean="0">
+                              <a:latin typeface="Cambria Math" panose="02040503050406030204" pitchFamily="18" charset="0"/>
+                            </a:rPr>
+                          </m:ctrlPr>
+                        </m:fPr>
+                        <m:num>
+                          <m:r>
+                            <a:rPr lang="da-DK" b="0" i="1" smtClean="0">
+                              <a:latin typeface="Cambria Math" panose="02040503050406030204" pitchFamily="18" charset="0"/>
+                            </a:rPr>
+                            <m:t>𝐾</m:t>
+                          </m:r>
+                        </m:num>
+                        <m:den>
+                          <m:r>
+                            <a:rPr lang="da-DK" b="0" i="1" smtClean="0">
+                              <a:latin typeface="Cambria Math" panose="02040503050406030204" pitchFamily="18" charset="0"/>
+                            </a:rPr>
+                            <m:t>𝜏</m:t>
+                          </m:r>
+                          <m:r>
+                            <a:rPr lang="da-DK" b="0" i="1" smtClean="0">
+                              <a:latin typeface="Cambria Math" panose="02040503050406030204" pitchFamily="18" charset="0"/>
+                            </a:rPr>
+                            <m:t>𝑠</m:t>
+                          </m:r>
+                          <m:r>
+                            <a:rPr lang="da-DK" b="0" i="1" smtClean="0">
+                              <a:latin typeface="Cambria Math" panose="02040503050406030204" pitchFamily="18" charset="0"/>
+                            </a:rPr>
+                            <m:t>+1</m:t>
+                          </m:r>
+                        </m:den>
+                      </m:f>
+                    </m:oMath>
+                  </m:oMathPara>
+                </a14:m>
+                <a:endParaRPr lang="en-US" dirty="0"/>
+              </a:p>
+            </p:txBody>
+          </p:sp>
+        </mc:Choice>
+        <mc:Fallback>
+          <p:sp>
+            <p:nvSpPr>
+              <p:cNvPr id="4" name="Rektangel 3"/>
+              <p:cNvSpPr>
+                <a:spLocks noRot="1" noChangeAspect="1" noMove="1" noResize="1" noEditPoints="1" noAdjustHandles="1" noChangeArrowheads="1" noChangeShapeType="1" noTextEdit="1"/>
+              </p:cNvSpPr>
+              <p:nvPr/>
+            </p:nvSpPr>
+            <p:spPr>
+              <a:xfrm>
+                <a:off x="6153667" y="1326290"/>
+                <a:ext cx="1243913" cy="922638"/>
+              </a:xfrm>
+              <a:prstGeom prst="rect">
+                <a:avLst/>
+              </a:prstGeom>
+              <a:blipFill rotWithShape="0">
+                <a:blip r:embed="rId2"/>
+                <a:stretch>
+                  <a:fillRect/>
+                </a:stretch>
+              </a:blipFill>
+            </p:spPr>
+            <p:txBody>
+              <a:bodyPr/>
+              <a:lstStyle/>
+              <a:p>
+                <a:r>
+                  <a:rPr lang="en-US">
+                    <a:noFill/>
+                  </a:rPr>
+                  <a:t> </a:t>
+                </a:r>
+              </a:p>
+            </p:txBody>
+          </p:sp>
+        </mc:Fallback>
+      </mc:AlternateContent>
+      <mc:AlternateContent xmlns:mc="http://schemas.openxmlformats.org/markup-compatibility/2006">
+        <mc:Choice xmlns:a14="http://schemas.microsoft.com/office/drawing/2010/main" Requires="a14">
+          <p:sp>
+            <p:nvSpPr>
+              <p:cNvPr id="5" name="Rektangel 4"/>
+              <p:cNvSpPr/>
+              <p:nvPr/>
+            </p:nvSpPr>
+            <p:spPr>
+              <a:xfrm>
+                <a:off x="3297188" y="1412785"/>
+                <a:ext cx="955589" cy="749643"/>
+              </a:xfrm>
+              <a:prstGeom prst="rect">
+                <a:avLst/>
+              </a:prstGeom>
+            </p:spPr>
+            <p:style>
+              <a:lnRef idx="1">
+                <a:schemeClr val="dk1"/>
+              </a:lnRef>
+              <a:fillRef idx="2">
+                <a:schemeClr val="dk1"/>
+              </a:fillRef>
+              <a:effectRef idx="1">
+                <a:schemeClr val="dk1"/>
+              </a:effectRef>
+              <a:fontRef idx="minor">
+                <a:schemeClr val="dk1"/>
+              </a:fontRef>
+            </p:style>
+            <p:txBody>
+              <a:bodyPr rtlCol="0" anchor="ctr"/>
+              <a:lstStyle/>
+              <a:p>
+                <a:pPr algn="ctr"/>
+                <a14:m>
+                  <m:oMathPara xmlns:m="http://schemas.openxmlformats.org/officeDocument/2006/math">
+                    <m:oMathParaPr>
+                      <m:jc m:val="centerGroup"/>
+                    </m:oMathParaPr>
+                    <m:oMath xmlns:m="http://schemas.openxmlformats.org/officeDocument/2006/math">
+                      <m:sSub>
+                        <m:sSubPr>
+                          <m:ctrlPr>
+                            <a:rPr lang="da-DK" b="0" i="1" smtClean="0">
+                              <a:latin typeface="Cambria Math" panose="02040503050406030204" pitchFamily="18" charset="0"/>
+                            </a:rPr>
+                          </m:ctrlPr>
+                        </m:sSubPr>
+                        <m:e>
+                          <m:r>
+                            <a:rPr lang="da-DK" b="0" i="1" smtClean="0">
+                              <a:latin typeface="Cambria Math" panose="02040503050406030204" pitchFamily="18" charset="0"/>
+                            </a:rPr>
+                            <m:t>𝐾</m:t>
+                          </m:r>
+                        </m:e>
+                        <m:sub>
+                          <m:r>
+                            <a:rPr lang="da-DK" b="0" i="1" smtClean="0">
+                              <a:latin typeface="Cambria Math" panose="02040503050406030204" pitchFamily="18" charset="0"/>
+                            </a:rPr>
+                            <m:t>𝑐</m:t>
+                          </m:r>
+                        </m:sub>
+                      </m:sSub>
+                    </m:oMath>
+                  </m:oMathPara>
+                </a14:m>
+                <a:endParaRPr lang="en-US" dirty="0"/>
+              </a:p>
+            </p:txBody>
+          </p:sp>
+        </mc:Choice>
+        <mc:Fallback>
+          <p:sp>
+            <p:nvSpPr>
+              <p:cNvPr id="5" name="Rektangel 4"/>
+              <p:cNvSpPr>
+                <a:spLocks noRot="1" noChangeAspect="1" noMove="1" noResize="1" noEditPoints="1" noAdjustHandles="1" noChangeArrowheads="1" noChangeShapeType="1" noTextEdit="1"/>
+              </p:cNvSpPr>
+              <p:nvPr/>
+            </p:nvSpPr>
+            <p:spPr>
+              <a:xfrm>
+                <a:off x="3297188" y="1412785"/>
+                <a:ext cx="955589" cy="749643"/>
+              </a:xfrm>
+              <a:prstGeom prst="rect">
+                <a:avLst/>
+              </a:prstGeom>
+              <a:blipFill rotWithShape="0">
+                <a:blip r:embed="rId3"/>
+                <a:stretch>
+                  <a:fillRect/>
+                </a:stretch>
+              </a:blipFill>
+            </p:spPr>
+            <p:txBody>
+              <a:bodyPr/>
+              <a:lstStyle/>
+              <a:p>
+                <a:r>
+                  <a:rPr lang="en-US">
+                    <a:noFill/>
+                  </a:rPr>
+                  <a:t> </a:t>
+                </a:r>
+              </a:p>
+            </p:txBody>
+          </p:sp>
+        </mc:Fallback>
+      </mc:AlternateContent>
+      <p:sp>
+        <p:nvSpPr>
+          <p:cNvPr id="7" name="Opsummeringspunkt 6"/>
+          <p:cNvSpPr/>
+          <p:nvPr/>
+        </p:nvSpPr>
+        <p:spPr>
+          <a:xfrm>
+            <a:off x="4905633" y="1556950"/>
+            <a:ext cx="453081" cy="461319"/>
+          </a:xfrm>
+          <a:prstGeom prst="flowChartSummingJunction">
+            <a:avLst/>
+          </a:prstGeom>
+        </p:spPr>
+        <p:style>
+          <a:lnRef idx="2">
+            <a:schemeClr val="dk1"/>
+          </a:lnRef>
+          <a:fillRef idx="1">
+            <a:schemeClr val="lt1"/>
+          </a:fillRef>
+          <a:effectRef idx="0">
+            <a:schemeClr val="dk1"/>
+          </a:effectRef>
+          <a:fontRef idx="minor">
+            <a:schemeClr val="dk1"/>
+          </a:fontRef>
+        </p:style>
+        <p:txBody>
+          <a:bodyPr rtlCol="0" anchor="ctr"/>
+          <a:lstStyle/>
+          <a:p>
+            <a:pPr algn="ctr"/>
+            <a:endParaRPr lang="en-US"/>
+          </a:p>
+        </p:txBody>
+      </p:sp>
+      <p:cxnSp>
+        <p:nvCxnSpPr>
+          <p:cNvPr id="9" name="Vinklet forbindelse 8"/>
+          <p:cNvCxnSpPr>
+            <a:stCxn id="5" idx="3"/>
+            <a:endCxn id="7" idx="2"/>
+          </p:cNvCxnSpPr>
+          <p:nvPr/>
+        </p:nvCxnSpPr>
+        <p:spPr>
+          <a:xfrm>
+            <a:off x="4252777" y="1787607"/>
+            <a:ext cx="652856" cy="3"/>
+          </a:xfrm>
+          <a:prstGeom prst="bentConnector3">
+            <a:avLst/>
+          </a:prstGeom>
+          <a:ln>
+            <a:tailEnd type="triangle"/>
+          </a:ln>
+        </p:spPr>
+        <p:style>
+          <a:lnRef idx="1">
+            <a:schemeClr val="dk1"/>
+          </a:lnRef>
+          <a:fillRef idx="0">
+            <a:schemeClr val="dk1"/>
+          </a:fillRef>
+          <a:effectRef idx="0">
+            <a:schemeClr val="dk1"/>
+          </a:effectRef>
+          <a:fontRef idx="minor">
+            <a:schemeClr val="tx1"/>
+          </a:fontRef>
+        </p:style>
+      </p:cxnSp>
+      <p:cxnSp>
+        <p:nvCxnSpPr>
+          <p:cNvPr id="11" name="Vinklet forbindelse 10"/>
+          <p:cNvCxnSpPr>
+            <a:stCxn id="7" idx="6"/>
+            <a:endCxn id="4" idx="1"/>
+          </p:cNvCxnSpPr>
+          <p:nvPr/>
+        </p:nvCxnSpPr>
+        <p:spPr>
+          <a:xfrm flipV="1">
+            <a:off x="5358714" y="1787609"/>
+            <a:ext cx="794953" cy="1"/>
+          </a:xfrm>
+          <a:prstGeom prst="bentConnector3">
+            <a:avLst/>
+          </a:prstGeom>
+          <a:ln>
+            <a:tailEnd type="triangle"/>
+          </a:ln>
+        </p:spPr>
+        <p:style>
+          <a:lnRef idx="1">
+            <a:schemeClr val="dk1"/>
+          </a:lnRef>
+          <a:fillRef idx="0">
+            <a:schemeClr val="dk1"/>
+          </a:fillRef>
+          <a:effectRef idx="0">
+            <a:schemeClr val="dk1"/>
+          </a:effectRef>
+          <a:fontRef idx="minor">
+            <a:schemeClr val="tx1"/>
+          </a:fontRef>
+        </p:style>
+      </p:cxnSp>
+      <p:cxnSp>
+        <p:nvCxnSpPr>
+          <p:cNvPr id="14" name="Vinklet forbindelse 13"/>
+          <p:cNvCxnSpPr>
+            <a:endCxn id="7" idx="0"/>
+          </p:cNvCxnSpPr>
+          <p:nvPr/>
+        </p:nvCxnSpPr>
+        <p:spPr>
+          <a:xfrm rot="16200000" flipH="1">
+            <a:off x="4860325" y="1285101"/>
+            <a:ext cx="543696" cy="1"/>
+          </a:xfrm>
+          <a:prstGeom prst="bentConnector3">
+            <a:avLst/>
+          </a:prstGeom>
+          <a:ln>
+            <a:tailEnd type="triangle"/>
+          </a:ln>
+        </p:spPr>
+        <p:style>
+          <a:lnRef idx="1">
+            <a:schemeClr val="dk1"/>
+          </a:lnRef>
+          <a:fillRef idx="0">
+            <a:schemeClr val="dk1"/>
+          </a:fillRef>
+          <a:effectRef idx="0">
+            <a:schemeClr val="dk1"/>
+          </a:effectRef>
+          <a:fontRef idx="minor">
+            <a:schemeClr val="tx1"/>
+          </a:fontRef>
+        </p:style>
+      </p:cxnSp>
+      <p:sp>
+        <p:nvSpPr>
+          <p:cNvPr id="16" name="Ellipse 15"/>
+          <p:cNvSpPr/>
+          <p:nvPr/>
+        </p:nvSpPr>
+        <p:spPr>
+          <a:xfrm>
+            <a:off x="8099860" y="1549253"/>
+            <a:ext cx="440711" cy="461319"/>
+          </a:xfrm>
+          <a:prstGeom prst="ellipse">
+            <a:avLst/>
+          </a:prstGeom>
+        </p:spPr>
+        <p:style>
+          <a:lnRef idx="2">
+            <a:schemeClr val="dk1"/>
+          </a:lnRef>
+          <a:fillRef idx="1">
+            <a:schemeClr val="lt1"/>
+          </a:fillRef>
+          <a:effectRef idx="0">
+            <a:schemeClr val="dk1"/>
+          </a:effectRef>
+          <a:fontRef idx="minor">
+            <a:schemeClr val="dk1"/>
+          </a:fontRef>
+        </p:style>
+        <p:txBody>
+          <a:bodyPr rtlCol="0" anchor="ctr"/>
+          <a:lstStyle/>
+          <a:p>
+            <a:pPr algn="ctr"/>
+            <a:endParaRPr lang="en-US"/>
+          </a:p>
+        </p:txBody>
+      </p:sp>
+      <p:sp>
+        <p:nvSpPr>
+          <p:cNvPr id="17" name="Tekstfelt 16"/>
+          <p:cNvSpPr txBox="1"/>
+          <p:nvPr/>
+        </p:nvSpPr>
+        <p:spPr>
+          <a:xfrm>
+            <a:off x="8192533" y="1437501"/>
+            <a:ext cx="185345" cy="338554"/>
+          </a:xfrm>
+          <a:prstGeom prst="rect">
+            <a:avLst/>
+          </a:prstGeom>
+          <a:noFill/>
+        </p:spPr>
+        <p:txBody>
+          <a:bodyPr wrap="square" rtlCol="0">
+            <a:spAutoFit/>
+          </a:bodyPr>
+          <a:lstStyle/>
+          <a:p>
+            <a:r>
+              <a:rPr lang="da-DK" sz="1600" b="1" dirty="0" smtClean="0"/>
+              <a:t>-</a:t>
+            </a:r>
+            <a:endParaRPr lang="en-US" sz="1000" b="1" dirty="0"/>
+          </a:p>
+        </p:txBody>
+      </p:sp>
+      <p:sp>
+        <p:nvSpPr>
+          <p:cNvPr id="18" name="Tekstfelt 17"/>
+          <p:cNvSpPr txBox="1"/>
+          <p:nvPr/>
+        </p:nvSpPr>
+        <p:spPr>
+          <a:xfrm>
+            <a:off x="8055580" y="1645250"/>
+            <a:ext cx="181233" cy="261610"/>
+          </a:xfrm>
+          <a:prstGeom prst="rect">
+            <a:avLst/>
+          </a:prstGeom>
+          <a:noFill/>
+        </p:spPr>
+        <p:txBody>
+          <a:bodyPr wrap="square" rtlCol="0">
+            <a:spAutoFit/>
+          </a:bodyPr>
+          <a:lstStyle/>
+          <a:p>
+            <a:r>
+              <a:rPr lang="da-DK" sz="1100" b="1" dirty="0" smtClean="0"/>
+              <a:t>+</a:t>
+            </a:r>
+            <a:endParaRPr lang="en-US" sz="1100" b="1" dirty="0"/>
+          </a:p>
+        </p:txBody>
+      </p:sp>
+      <p:sp>
+        <p:nvSpPr>
+          <p:cNvPr id="19" name="Ellipse 18"/>
+          <p:cNvSpPr/>
+          <p:nvPr/>
+        </p:nvSpPr>
+        <p:spPr>
+          <a:xfrm>
+            <a:off x="2250981" y="1556949"/>
+            <a:ext cx="453080" cy="461319"/>
+          </a:xfrm>
+          <a:prstGeom prst="ellipse">
+            <a:avLst/>
+          </a:prstGeom>
+        </p:spPr>
+        <p:style>
+          <a:lnRef idx="2">
+            <a:schemeClr val="dk1"/>
+          </a:lnRef>
+          <a:fillRef idx="1">
+            <a:schemeClr val="lt1"/>
+          </a:fillRef>
+          <a:effectRef idx="0">
+            <a:schemeClr val="dk1"/>
+          </a:effectRef>
+          <a:fontRef idx="minor">
+            <a:schemeClr val="dk1"/>
+          </a:fontRef>
+        </p:style>
+        <p:txBody>
+          <a:bodyPr rtlCol="0" anchor="ctr"/>
+          <a:lstStyle/>
+          <a:p>
+            <a:pPr algn="ctr"/>
+            <a:endParaRPr lang="en-US"/>
+          </a:p>
+        </p:txBody>
+      </p:sp>
+      <p:sp>
+        <p:nvSpPr>
+          <p:cNvPr id="20" name="Tekstfelt 19"/>
+          <p:cNvSpPr txBox="1"/>
+          <p:nvPr/>
+        </p:nvSpPr>
+        <p:spPr>
+          <a:xfrm>
+            <a:off x="2345725" y="1752882"/>
+            <a:ext cx="185345" cy="338554"/>
+          </a:xfrm>
+          <a:prstGeom prst="rect">
+            <a:avLst/>
+          </a:prstGeom>
+          <a:noFill/>
+        </p:spPr>
+        <p:txBody>
+          <a:bodyPr wrap="square" rtlCol="0">
+            <a:spAutoFit/>
+          </a:bodyPr>
+          <a:lstStyle/>
+          <a:p>
+            <a:r>
+              <a:rPr lang="da-DK" sz="1600" b="1" dirty="0" smtClean="0"/>
+              <a:t>-</a:t>
+            </a:r>
+            <a:endParaRPr lang="en-US" sz="1000" b="1" dirty="0"/>
+          </a:p>
+        </p:txBody>
+      </p:sp>
+      <p:sp>
+        <p:nvSpPr>
+          <p:cNvPr id="21" name="Tekstfelt 20"/>
+          <p:cNvSpPr txBox="1"/>
+          <p:nvPr/>
+        </p:nvSpPr>
+        <p:spPr>
+          <a:xfrm>
+            <a:off x="2205675" y="1649108"/>
+            <a:ext cx="181233" cy="261610"/>
+          </a:xfrm>
+          <a:prstGeom prst="rect">
+            <a:avLst/>
+          </a:prstGeom>
+          <a:noFill/>
+        </p:spPr>
+        <p:txBody>
+          <a:bodyPr wrap="square" rtlCol="0">
+            <a:spAutoFit/>
+          </a:bodyPr>
+          <a:lstStyle/>
+          <a:p>
+            <a:r>
+              <a:rPr lang="da-DK" sz="1100" b="1" dirty="0" smtClean="0"/>
+              <a:t>+</a:t>
+            </a:r>
+            <a:endParaRPr lang="en-US" sz="1100" b="1" dirty="0"/>
+          </a:p>
+        </p:txBody>
+      </p:sp>
+      <p:cxnSp>
+        <p:nvCxnSpPr>
+          <p:cNvPr id="23" name="Vinklet forbindelse 22"/>
+          <p:cNvCxnSpPr>
+            <a:stCxn id="19" idx="6"/>
+            <a:endCxn id="5" idx="1"/>
+          </p:cNvCxnSpPr>
+          <p:nvPr/>
+        </p:nvCxnSpPr>
+        <p:spPr>
+          <a:xfrm flipV="1">
+            <a:off x="2704061" y="1787607"/>
+            <a:ext cx="593127" cy="2"/>
+          </a:xfrm>
+          <a:prstGeom prst="bentConnector3">
+            <a:avLst/>
+          </a:prstGeom>
+          <a:ln>
+            <a:tailEnd type="triangle"/>
+          </a:ln>
+        </p:spPr>
+        <p:style>
+          <a:lnRef idx="1">
+            <a:schemeClr val="dk1"/>
+          </a:lnRef>
+          <a:fillRef idx="0">
+            <a:schemeClr val="dk1"/>
+          </a:fillRef>
+          <a:effectRef idx="0">
+            <a:schemeClr val="dk1"/>
+          </a:effectRef>
+          <a:fontRef idx="minor">
+            <a:schemeClr val="tx1"/>
+          </a:fontRef>
+        </p:style>
+      </p:cxnSp>
+      <p:cxnSp>
+        <p:nvCxnSpPr>
+          <p:cNvPr id="44" name="Lige pilforbindelse 43"/>
+          <p:cNvCxnSpPr>
+            <a:stCxn id="4" idx="3"/>
+            <a:endCxn id="16" idx="2"/>
+          </p:cNvCxnSpPr>
+          <p:nvPr/>
+        </p:nvCxnSpPr>
+        <p:spPr>
+          <a:xfrm flipV="1">
+            <a:off x="7397580" y="1779913"/>
+            <a:ext cx="702280" cy="7696"/>
+          </a:xfrm>
+          <a:prstGeom prst="straightConnector1">
+            <a:avLst/>
+          </a:prstGeom>
+          <a:ln>
+            <a:tailEnd type="triangle"/>
+          </a:ln>
+        </p:spPr>
+        <p:style>
+          <a:lnRef idx="1">
+            <a:schemeClr val="dk1"/>
+          </a:lnRef>
+          <a:fillRef idx="0">
+            <a:schemeClr val="dk1"/>
+          </a:fillRef>
+          <a:effectRef idx="0">
+            <a:schemeClr val="dk1"/>
+          </a:effectRef>
+          <a:fontRef idx="minor">
+            <a:schemeClr val="tx1"/>
+          </a:fontRef>
+        </p:style>
+      </p:cxnSp>
+      <p:cxnSp>
+        <p:nvCxnSpPr>
+          <p:cNvPr id="46" name="Vinklet forbindelse 45"/>
+          <p:cNvCxnSpPr/>
+          <p:nvPr/>
+        </p:nvCxnSpPr>
+        <p:spPr>
+          <a:xfrm rot="16200000" flipH="1">
+            <a:off x="8048367" y="1277405"/>
+            <a:ext cx="543696" cy="1"/>
+          </a:xfrm>
+          <a:prstGeom prst="bentConnector3">
+            <a:avLst/>
+          </a:prstGeom>
+          <a:ln>
+            <a:tailEnd type="triangle"/>
+          </a:ln>
+        </p:spPr>
+        <p:style>
+          <a:lnRef idx="1">
+            <a:schemeClr val="dk1"/>
+          </a:lnRef>
+          <a:fillRef idx="0">
+            <a:schemeClr val="dk1"/>
+          </a:fillRef>
+          <a:effectRef idx="0">
+            <a:schemeClr val="dk1"/>
+          </a:effectRef>
+          <a:fontRef idx="minor">
+            <a:schemeClr val="tx1"/>
+          </a:fontRef>
+        </p:style>
+      </p:cxnSp>
+      <p:cxnSp>
+        <p:nvCxnSpPr>
+          <p:cNvPr id="47" name="Lige pilforbindelse 46"/>
+          <p:cNvCxnSpPr>
+            <a:stCxn id="16" idx="6"/>
+            <a:endCxn id="52" idx="1"/>
+          </p:cNvCxnSpPr>
+          <p:nvPr/>
+        </p:nvCxnSpPr>
+        <p:spPr>
+          <a:xfrm flipV="1">
+            <a:off x="8540571" y="1776055"/>
+            <a:ext cx="459261" cy="3858"/>
+          </a:xfrm>
+          <a:prstGeom prst="straightConnector1">
+            <a:avLst/>
+          </a:prstGeom>
+          <a:ln>
+            <a:tailEnd type="triangle"/>
+          </a:ln>
+        </p:spPr>
+        <p:style>
+          <a:lnRef idx="1">
+            <a:schemeClr val="dk1"/>
+          </a:lnRef>
+          <a:fillRef idx="0">
+            <a:schemeClr val="dk1"/>
+          </a:fillRef>
+          <a:effectRef idx="0">
+            <a:schemeClr val="dk1"/>
+          </a:effectRef>
+          <a:fontRef idx="minor">
+            <a:schemeClr val="tx1"/>
+          </a:fontRef>
+        </p:style>
+      </p:cxnSp>
+      <mc:AlternateContent xmlns:mc="http://schemas.openxmlformats.org/markup-compatibility/2006">
+        <mc:Choice xmlns:a14="http://schemas.microsoft.com/office/drawing/2010/main" Requires="a14">
+          <p:sp>
+            <p:nvSpPr>
+              <p:cNvPr id="52" name="Rektangel 51"/>
+              <p:cNvSpPr/>
+              <p:nvPr/>
+            </p:nvSpPr>
+            <p:spPr>
+              <a:xfrm>
+                <a:off x="8999832" y="1377684"/>
+                <a:ext cx="302734" cy="796741"/>
+              </a:xfrm>
+              <a:prstGeom prst="rect">
+                <a:avLst/>
+              </a:prstGeom>
+            </p:spPr>
+            <p:style>
+              <a:lnRef idx="1">
+                <a:schemeClr val="dk1"/>
+              </a:lnRef>
+              <a:fillRef idx="2">
+                <a:schemeClr val="dk1"/>
+              </a:fillRef>
+              <a:effectRef idx="1">
+                <a:schemeClr val="dk1"/>
+              </a:effectRef>
+              <a:fontRef idx="minor">
+                <a:schemeClr val="dk1"/>
+              </a:fontRef>
+            </p:style>
+            <p:txBody>
+              <a:bodyPr rtlCol="0" anchor="ctr"/>
+              <a:lstStyle/>
+              <a:p>
+                <a:pPr algn="ctr"/>
+                <a14:m>
+                  <m:oMathPara xmlns:m="http://schemas.openxmlformats.org/officeDocument/2006/math">
+                    <m:oMathParaPr>
+                      <m:jc m:val="centerGroup"/>
+                    </m:oMathParaPr>
+                    <m:oMath xmlns:m="http://schemas.openxmlformats.org/officeDocument/2006/math">
+                      <m:f>
+                        <m:fPr>
+                          <m:ctrlPr>
+                            <a:rPr lang="en-US" i="1" smtClean="0">
+                              <a:latin typeface="Cambria Math" panose="02040503050406030204" pitchFamily="18" charset="0"/>
+                            </a:rPr>
+                          </m:ctrlPr>
+                        </m:fPr>
+                        <m:num>
+                          <m:r>
+                            <a:rPr lang="da-DK" b="0" i="1" smtClean="0">
+                              <a:latin typeface="Cambria Math" panose="02040503050406030204" pitchFamily="18" charset="0"/>
+                            </a:rPr>
+                            <m:t>1</m:t>
+                          </m:r>
+                        </m:num>
+                        <m:den>
+                          <m:r>
+                            <a:rPr lang="da-DK" b="0" i="1" smtClean="0">
+                              <a:latin typeface="Cambria Math" panose="02040503050406030204" pitchFamily="18" charset="0"/>
+                            </a:rPr>
+                            <m:t>𝑠</m:t>
+                          </m:r>
+                        </m:den>
+                      </m:f>
+                    </m:oMath>
+                  </m:oMathPara>
+                </a14:m>
+                <a:endParaRPr lang="en-US" dirty="0"/>
+              </a:p>
+            </p:txBody>
+          </p:sp>
+        </mc:Choice>
+        <mc:Fallback>
+          <p:sp>
+            <p:nvSpPr>
+              <p:cNvPr id="52" name="Rektangel 51"/>
+              <p:cNvSpPr>
+                <a:spLocks noRot="1" noChangeAspect="1" noMove="1" noResize="1" noEditPoints="1" noAdjustHandles="1" noChangeArrowheads="1" noChangeShapeType="1" noTextEdit="1"/>
+              </p:cNvSpPr>
+              <p:nvPr/>
+            </p:nvSpPr>
+            <p:spPr>
+              <a:xfrm>
+                <a:off x="8999832" y="1377684"/>
+                <a:ext cx="302734" cy="796741"/>
+              </a:xfrm>
+              <a:prstGeom prst="rect">
+                <a:avLst/>
+              </a:prstGeom>
+              <a:blipFill rotWithShape="0">
+                <a:blip r:embed="rId4"/>
+                <a:stretch>
+                  <a:fillRect/>
+                </a:stretch>
+              </a:blipFill>
+            </p:spPr>
+            <p:txBody>
+              <a:bodyPr/>
+              <a:lstStyle/>
+              <a:p>
+                <a:r>
+                  <a:rPr lang="en-US">
+                    <a:noFill/>
+                  </a:rPr>
+                  <a:t> </a:t>
+                </a:r>
+              </a:p>
+            </p:txBody>
+          </p:sp>
+        </mc:Fallback>
+      </mc:AlternateContent>
+      <p:cxnSp>
+        <p:nvCxnSpPr>
+          <p:cNvPr id="56" name="Lige pilforbindelse 55"/>
+          <p:cNvCxnSpPr>
+            <a:stCxn id="52" idx="3"/>
+          </p:cNvCxnSpPr>
+          <p:nvPr/>
+        </p:nvCxnSpPr>
+        <p:spPr>
+          <a:xfrm flipV="1">
+            <a:off x="9302566" y="1776054"/>
+            <a:ext cx="1821607" cy="1"/>
+          </a:xfrm>
+          <a:prstGeom prst="straightConnector1">
+            <a:avLst/>
+          </a:prstGeom>
+          <a:ln>
+            <a:tailEnd type="triangle"/>
+          </a:ln>
+        </p:spPr>
+        <p:style>
+          <a:lnRef idx="1">
+            <a:schemeClr val="dk1"/>
+          </a:lnRef>
+          <a:fillRef idx="0">
+            <a:schemeClr val="dk1"/>
+          </a:fillRef>
+          <a:effectRef idx="0">
+            <a:schemeClr val="dk1"/>
+          </a:effectRef>
+          <a:fontRef idx="minor">
+            <a:schemeClr val="tx1"/>
+          </a:fontRef>
+        </p:style>
+      </p:cxnSp>
+      <p:cxnSp>
+        <p:nvCxnSpPr>
+          <p:cNvPr id="61" name="Vinklet forbindelse 60"/>
+          <p:cNvCxnSpPr>
+            <a:endCxn id="19" idx="4"/>
+          </p:cNvCxnSpPr>
+          <p:nvPr/>
+        </p:nvCxnSpPr>
+        <p:spPr>
+          <a:xfrm rot="10800000" flipV="1">
+            <a:off x="2477521" y="1779912"/>
+            <a:ext cx="7646782" cy="238356"/>
+          </a:xfrm>
+          <a:prstGeom prst="bentConnector4">
+            <a:avLst>
+              <a:gd name="adj1" fmla="val 54"/>
+              <a:gd name="adj2" fmla="val 420554"/>
+            </a:avLst>
+          </a:prstGeom>
+          <a:ln>
+            <a:tailEnd type="triangle"/>
+          </a:ln>
+        </p:spPr>
+        <p:style>
+          <a:lnRef idx="1">
+            <a:schemeClr val="dk1"/>
+          </a:lnRef>
+          <a:fillRef idx="0">
+            <a:schemeClr val="dk1"/>
+          </a:fillRef>
+          <a:effectRef idx="0">
+            <a:schemeClr val="dk1"/>
+          </a:effectRef>
+          <a:fontRef idx="minor">
+            <a:schemeClr val="tx1"/>
+          </a:fontRef>
+        </p:style>
+      </p:cxnSp>
+      <p:cxnSp>
+        <p:nvCxnSpPr>
+          <p:cNvPr id="69" name="Lige pilforbindelse 68"/>
+          <p:cNvCxnSpPr/>
+          <p:nvPr/>
+        </p:nvCxnSpPr>
+        <p:spPr>
+          <a:xfrm flipV="1">
+            <a:off x="1324234" y="1779913"/>
+            <a:ext cx="922637" cy="3848"/>
+          </a:xfrm>
+          <a:prstGeom prst="straightConnector1">
+            <a:avLst/>
+          </a:prstGeom>
+          <a:ln>
+            <a:tailEnd type="triangle"/>
+          </a:ln>
+        </p:spPr>
+        <p:style>
+          <a:lnRef idx="1">
+            <a:schemeClr val="dk1"/>
+          </a:lnRef>
+          <a:fillRef idx="0">
+            <a:schemeClr val="dk1"/>
+          </a:fillRef>
+          <a:effectRef idx="0">
+            <a:schemeClr val="dk1"/>
+          </a:effectRef>
+          <a:fontRef idx="minor">
+            <a:schemeClr val="tx1"/>
+          </a:fontRef>
+        </p:style>
+      </p:cxnSp>
+      <p:sp>
+        <p:nvSpPr>
+          <p:cNvPr id="71" name="Tekstfelt 70"/>
+          <p:cNvSpPr txBox="1"/>
+          <p:nvPr/>
+        </p:nvSpPr>
+        <p:spPr>
+          <a:xfrm>
+            <a:off x="4905633" y="679348"/>
+            <a:ext cx="659027" cy="379481"/>
+          </a:xfrm>
+          <a:prstGeom prst="rect">
+            <a:avLst/>
+          </a:prstGeom>
+          <a:noFill/>
+        </p:spPr>
+        <p:txBody>
+          <a:bodyPr wrap="square" rtlCol="0">
+            <a:spAutoFit/>
+          </a:bodyPr>
+          <a:lstStyle/>
+          <a:p>
+            <a:r>
+              <a:rPr lang="da-DK" dirty="0" smtClean="0"/>
+              <a:t>12V</a:t>
+            </a:r>
+            <a:endParaRPr lang="en-US" dirty="0"/>
+          </a:p>
+        </p:txBody>
+      </p:sp>
+      <mc:AlternateContent xmlns:mc="http://schemas.openxmlformats.org/markup-compatibility/2006">
+        <mc:Choice xmlns:a14="http://schemas.microsoft.com/office/drawing/2010/main" Requires="a14">
+          <p:sp>
+            <p:nvSpPr>
+              <p:cNvPr id="73" name="Tekstfelt 72"/>
+              <p:cNvSpPr txBox="1"/>
+              <p:nvPr/>
+            </p:nvSpPr>
+            <p:spPr>
+              <a:xfrm>
+                <a:off x="8023851" y="708662"/>
+                <a:ext cx="592726" cy="276999"/>
+              </a:xfrm>
+              <a:prstGeom prst="rect">
+                <a:avLst/>
+              </a:prstGeom>
+              <a:noFill/>
+            </p:spPr>
+            <p:txBody>
+              <a:bodyPr wrap="none" lIns="0" tIns="0" rIns="0" bIns="0" rtlCol="0">
+                <a:spAutoFit/>
+              </a:bodyPr>
+              <a:lstStyle/>
+              <a:p>
+                <a14:m>
+                  <m:oMathPara xmlns:m="http://schemas.openxmlformats.org/officeDocument/2006/math">
+                    <m:oMathParaPr>
+                      <m:jc m:val="centerGroup"/>
+                    </m:oMathParaPr>
+                    <m:oMath xmlns:m="http://schemas.openxmlformats.org/officeDocument/2006/math">
+                      <m:sSub>
+                        <m:sSubPr>
+                          <m:ctrlPr>
+                            <a:rPr lang="da-DK" b="0" i="1" smtClean="0">
+                              <a:latin typeface="Cambria Math" panose="02040503050406030204" pitchFamily="18" charset="0"/>
+                            </a:rPr>
+                          </m:ctrlPr>
+                        </m:sSubPr>
+                        <m:e>
+                          <m:r>
+                            <a:rPr lang="da-DK" b="0" i="1" smtClean="0">
+                              <a:latin typeface="Cambria Math" panose="02040503050406030204" pitchFamily="18" charset="0"/>
+                            </a:rPr>
+                            <m:t>𝑇</m:t>
+                          </m:r>
+                        </m:e>
+                        <m:sub>
+                          <m:r>
+                            <a:rPr lang="da-DK" b="0" i="1" smtClean="0">
+                              <a:latin typeface="Cambria Math" panose="02040503050406030204" pitchFamily="18" charset="0"/>
+                            </a:rPr>
+                            <m:t>𝑑</m:t>
+                          </m:r>
+                        </m:sub>
+                      </m:sSub>
+                      <m:r>
+                        <a:rPr lang="da-DK" b="0" i="1" smtClean="0">
+                          <a:latin typeface="Cambria Math" panose="02040503050406030204" pitchFamily="18" charset="0"/>
+                        </a:rPr>
+                        <m:t>(</m:t>
+                      </m:r>
+                      <m:r>
+                        <a:rPr lang="da-DK" b="0" i="1" smtClean="0">
+                          <a:latin typeface="Cambria Math" panose="02040503050406030204" pitchFamily="18" charset="0"/>
+                        </a:rPr>
+                        <m:t>𝑠</m:t>
+                      </m:r>
+                      <m:r>
+                        <a:rPr lang="da-DK" b="0" i="1" smtClean="0">
+                          <a:latin typeface="Cambria Math" panose="02040503050406030204" pitchFamily="18" charset="0"/>
+                        </a:rPr>
+                        <m:t>)</m:t>
+                      </m:r>
+                    </m:oMath>
+                  </m:oMathPara>
+                </a14:m>
+                <a:endParaRPr lang="en-US" dirty="0"/>
+              </a:p>
+            </p:txBody>
+          </p:sp>
+        </mc:Choice>
+        <mc:Fallback>
+          <p:sp>
+            <p:nvSpPr>
+              <p:cNvPr id="73" name="Tekstfelt 72"/>
+              <p:cNvSpPr txBox="1">
+                <a:spLocks noRot="1" noChangeAspect="1" noMove="1" noResize="1" noEditPoints="1" noAdjustHandles="1" noChangeArrowheads="1" noChangeShapeType="1" noTextEdit="1"/>
+              </p:cNvSpPr>
+              <p:nvPr/>
+            </p:nvSpPr>
+            <p:spPr>
+              <a:xfrm>
+                <a:off x="8023851" y="708662"/>
+                <a:ext cx="592726" cy="276999"/>
+              </a:xfrm>
+              <a:prstGeom prst="rect">
+                <a:avLst/>
+              </a:prstGeom>
+              <a:blipFill rotWithShape="0">
+                <a:blip r:embed="rId5"/>
+                <a:stretch>
+                  <a:fillRect l="-8247" t="-2174" r="-14433" b="-32609"/>
+                </a:stretch>
+              </a:blipFill>
+            </p:spPr>
+            <p:txBody>
+              <a:bodyPr/>
+              <a:lstStyle/>
+              <a:p>
+                <a:r>
+                  <a:rPr lang="en-US">
+                    <a:noFill/>
+                  </a:rPr>
+                  <a:t> </a:t>
+                </a:r>
+              </a:p>
+            </p:txBody>
+          </p:sp>
+        </mc:Fallback>
+      </mc:AlternateContent>
+      <mc:AlternateContent xmlns:mc="http://schemas.openxmlformats.org/markup-compatibility/2006">
+        <mc:Choice xmlns:a14="http://schemas.microsoft.com/office/drawing/2010/main" Requires="a14">
+          <p:sp>
+            <p:nvSpPr>
+              <p:cNvPr id="75" name="Tekstfelt 74"/>
+              <p:cNvSpPr txBox="1"/>
+              <p:nvPr/>
+            </p:nvSpPr>
+            <p:spPr>
+              <a:xfrm>
+                <a:off x="1320124" y="1506762"/>
+                <a:ext cx="511615" cy="276999"/>
+              </a:xfrm>
+              <a:prstGeom prst="rect">
+                <a:avLst/>
+              </a:prstGeom>
+              <a:noFill/>
+            </p:spPr>
+            <p:txBody>
+              <a:bodyPr wrap="none" lIns="0" tIns="0" rIns="0" bIns="0" rtlCol="0">
+                <a:spAutoFit/>
+              </a:bodyPr>
+              <a:lstStyle/>
+              <a:p>
+                <a14:m>
+                  <m:oMathPara xmlns:m="http://schemas.openxmlformats.org/officeDocument/2006/math">
+                    <m:oMathParaPr>
+                      <m:jc m:val="centerGroup"/>
+                    </m:oMathParaPr>
+                    <m:oMath xmlns:m="http://schemas.openxmlformats.org/officeDocument/2006/math">
+                      <m:r>
+                        <a:rPr lang="da-DK" b="0" i="1" smtClean="0">
+                          <a:latin typeface="Cambria Math" panose="02040503050406030204" pitchFamily="18" charset="0"/>
+                        </a:rPr>
+                        <m:t>𝑅</m:t>
+                      </m:r>
+                      <m:r>
+                        <a:rPr lang="da-DK" b="0" i="1" smtClean="0">
+                          <a:latin typeface="Cambria Math" panose="02040503050406030204" pitchFamily="18" charset="0"/>
+                        </a:rPr>
+                        <m:t>(</m:t>
+                      </m:r>
+                      <m:r>
+                        <a:rPr lang="da-DK" b="0" i="1" smtClean="0">
+                          <a:latin typeface="Cambria Math" panose="02040503050406030204" pitchFamily="18" charset="0"/>
+                        </a:rPr>
+                        <m:t>𝑠</m:t>
+                      </m:r>
+                      <m:r>
+                        <a:rPr lang="da-DK" b="0" i="1" smtClean="0">
+                          <a:latin typeface="Cambria Math" panose="02040503050406030204" pitchFamily="18" charset="0"/>
+                        </a:rPr>
+                        <m:t>)</m:t>
+                      </m:r>
+                    </m:oMath>
+                  </m:oMathPara>
+                </a14:m>
+                <a:endParaRPr lang="en-US" dirty="0"/>
+              </a:p>
+            </p:txBody>
+          </p:sp>
+        </mc:Choice>
+        <mc:Fallback>
+          <p:sp>
+            <p:nvSpPr>
+              <p:cNvPr id="75" name="Tekstfelt 74"/>
+              <p:cNvSpPr txBox="1">
+                <a:spLocks noRot="1" noChangeAspect="1" noMove="1" noResize="1" noEditPoints="1" noAdjustHandles="1" noChangeArrowheads="1" noChangeShapeType="1" noTextEdit="1"/>
+              </p:cNvSpPr>
+              <p:nvPr/>
+            </p:nvSpPr>
+            <p:spPr>
+              <a:xfrm>
+                <a:off x="1320124" y="1506762"/>
+                <a:ext cx="511615" cy="276999"/>
+              </a:xfrm>
+              <a:prstGeom prst="rect">
+                <a:avLst/>
+              </a:prstGeom>
+              <a:blipFill rotWithShape="0">
+                <a:blip r:embed="rId6"/>
+                <a:stretch>
+                  <a:fillRect l="-10843" t="-2174" r="-18072" b="-32609"/>
+                </a:stretch>
+              </a:blipFill>
+            </p:spPr>
+            <p:txBody>
+              <a:bodyPr/>
+              <a:lstStyle/>
+              <a:p>
+                <a:r>
+                  <a:rPr lang="en-US">
+                    <a:noFill/>
+                  </a:rPr>
+                  <a:t> </a:t>
+                </a:r>
+              </a:p>
+            </p:txBody>
+          </p:sp>
+        </mc:Fallback>
+      </mc:AlternateContent>
+      <mc:AlternateContent xmlns:mc="http://schemas.openxmlformats.org/markup-compatibility/2006">
+        <mc:Choice xmlns:a14="http://schemas.microsoft.com/office/drawing/2010/main" Requires="a14">
+          <p:sp>
+            <p:nvSpPr>
+              <p:cNvPr id="76" name="Tekstfelt 75"/>
+              <p:cNvSpPr txBox="1"/>
+              <p:nvPr/>
+            </p:nvSpPr>
+            <p:spPr>
+              <a:xfrm>
+                <a:off x="10489857" y="1475883"/>
+                <a:ext cx="502510" cy="276999"/>
+              </a:xfrm>
+              <a:prstGeom prst="rect">
+                <a:avLst/>
+              </a:prstGeom>
+              <a:noFill/>
+            </p:spPr>
+            <p:txBody>
+              <a:bodyPr wrap="none" lIns="0" tIns="0" rIns="0" bIns="0" rtlCol="0">
+                <a:spAutoFit/>
+              </a:bodyPr>
+              <a:lstStyle/>
+              <a:p>
+                <a14:m>
+                  <m:oMathPara xmlns:m="http://schemas.openxmlformats.org/officeDocument/2006/math">
+                    <m:oMathParaPr>
+                      <m:jc m:val="centerGroup"/>
+                    </m:oMathParaPr>
+                    <m:oMath xmlns:m="http://schemas.openxmlformats.org/officeDocument/2006/math">
+                      <m:r>
+                        <a:rPr lang="da-DK" b="0" i="1" smtClean="0">
+                          <a:latin typeface="Cambria Math" panose="02040503050406030204" pitchFamily="18" charset="0"/>
+                        </a:rPr>
+                        <m:t>𝑌</m:t>
+                      </m:r>
+                      <m:r>
+                        <a:rPr lang="da-DK" b="0" i="1" smtClean="0">
+                          <a:latin typeface="Cambria Math" panose="02040503050406030204" pitchFamily="18" charset="0"/>
+                        </a:rPr>
+                        <m:t>(</m:t>
+                      </m:r>
+                      <m:r>
+                        <a:rPr lang="da-DK" b="0" i="1" smtClean="0">
+                          <a:latin typeface="Cambria Math" panose="02040503050406030204" pitchFamily="18" charset="0"/>
+                        </a:rPr>
+                        <m:t>𝑠</m:t>
+                      </m:r>
+                      <m:r>
+                        <a:rPr lang="da-DK" b="0" i="1" smtClean="0">
+                          <a:latin typeface="Cambria Math" panose="02040503050406030204" pitchFamily="18" charset="0"/>
+                        </a:rPr>
+                        <m:t>)</m:t>
+                      </m:r>
+                    </m:oMath>
+                  </m:oMathPara>
+                </a14:m>
+                <a:endParaRPr lang="en-US" dirty="0"/>
+              </a:p>
+            </p:txBody>
+          </p:sp>
+        </mc:Choice>
+        <mc:Fallback>
+          <p:sp>
+            <p:nvSpPr>
+              <p:cNvPr id="76" name="Tekstfelt 75"/>
+              <p:cNvSpPr txBox="1">
+                <a:spLocks noRot="1" noChangeAspect="1" noMove="1" noResize="1" noEditPoints="1" noAdjustHandles="1" noChangeArrowheads="1" noChangeShapeType="1" noTextEdit="1"/>
+              </p:cNvSpPr>
+              <p:nvPr/>
+            </p:nvSpPr>
+            <p:spPr>
+              <a:xfrm>
+                <a:off x="10489857" y="1475883"/>
+                <a:ext cx="502510" cy="276999"/>
+              </a:xfrm>
+              <a:prstGeom prst="rect">
+                <a:avLst/>
+              </a:prstGeom>
+              <a:blipFill rotWithShape="0">
+                <a:blip r:embed="rId7"/>
+                <a:stretch>
+                  <a:fillRect l="-10976" t="-2174" r="-17073" b="-32609"/>
+                </a:stretch>
+              </a:blipFill>
+            </p:spPr>
+            <p:txBody>
+              <a:bodyPr/>
+              <a:lstStyle/>
+              <a:p>
+                <a:r>
+                  <a:rPr lang="en-US">
+                    <a:noFill/>
+                  </a:rPr>
+                  <a:t> </a:t>
+                </a:r>
+              </a:p>
+            </p:txBody>
+          </p:sp>
+        </mc:Fallback>
+      </mc:AlternateContent>
+      <mc:AlternateContent xmlns:mc="http://schemas.openxmlformats.org/markup-compatibility/2006">
+        <mc:Choice xmlns:a14="http://schemas.microsoft.com/office/drawing/2010/main" Requires="a14">
+          <p:sp>
+            <p:nvSpPr>
+              <p:cNvPr id="79" name="Tekstfelt 78"/>
+              <p:cNvSpPr txBox="1"/>
+              <p:nvPr/>
+            </p:nvSpPr>
+            <p:spPr>
+              <a:xfrm>
+                <a:off x="2747356" y="1506762"/>
+                <a:ext cx="510717" cy="276999"/>
+              </a:xfrm>
+              <a:prstGeom prst="rect">
+                <a:avLst/>
+              </a:prstGeom>
+              <a:noFill/>
+            </p:spPr>
+            <p:txBody>
+              <a:bodyPr wrap="none" lIns="0" tIns="0" rIns="0" bIns="0" rtlCol="0">
+                <a:spAutoFit/>
+              </a:bodyPr>
+              <a:lstStyle/>
+              <a:p>
+                <a14:m>
+                  <m:oMathPara xmlns:m="http://schemas.openxmlformats.org/officeDocument/2006/math">
+                    <m:oMathParaPr>
+                      <m:jc m:val="centerGroup"/>
+                    </m:oMathParaPr>
+                    <m:oMath xmlns:m="http://schemas.openxmlformats.org/officeDocument/2006/math">
+                      <m:r>
+                        <a:rPr lang="da-DK" b="0" i="1" smtClean="0">
+                          <a:latin typeface="Cambria Math" panose="02040503050406030204" pitchFamily="18" charset="0"/>
+                        </a:rPr>
+                        <m:t>𝐸</m:t>
+                      </m:r>
+                      <m:r>
+                        <a:rPr lang="da-DK" b="0" i="1" smtClean="0">
+                          <a:latin typeface="Cambria Math" panose="02040503050406030204" pitchFamily="18" charset="0"/>
+                        </a:rPr>
+                        <m:t>(</m:t>
+                      </m:r>
+                      <m:r>
+                        <a:rPr lang="da-DK" b="0" i="1" smtClean="0">
+                          <a:latin typeface="Cambria Math" panose="02040503050406030204" pitchFamily="18" charset="0"/>
+                        </a:rPr>
+                        <m:t>𝑠</m:t>
+                      </m:r>
+                      <m:r>
+                        <a:rPr lang="da-DK" b="0" i="1" smtClean="0">
+                          <a:latin typeface="Cambria Math" panose="02040503050406030204" pitchFamily="18" charset="0"/>
+                        </a:rPr>
+                        <m:t>)</m:t>
+                      </m:r>
+                    </m:oMath>
+                  </m:oMathPara>
+                </a14:m>
+                <a:endParaRPr lang="en-US" dirty="0"/>
+              </a:p>
+            </p:txBody>
+          </p:sp>
+        </mc:Choice>
+        <mc:Fallback>
+          <p:sp>
+            <p:nvSpPr>
+              <p:cNvPr id="79" name="Tekstfelt 78"/>
+              <p:cNvSpPr txBox="1">
+                <a:spLocks noRot="1" noChangeAspect="1" noMove="1" noResize="1" noEditPoints="1" noAdjustHandles="1" noChangeArrowheads="1" noChangeShapeType="1" noTextEdit="1"/>
+              </p:cNvSpPr>
+              <p:nvPr/>
+            </p:nvSpPr>
+            <p:spPr>
+              <a:xfrm>
+                <a:off x="2747356" y="1506762"/>
+                <a:ext cx="510717" cy="276999"/>
+              </a:xfrm>
+              <a:prstGeom prst="rect">
+                <a:avLst/>
+              </a:prstGeom>
+              <a:blipFill rotWithShape="0">
+                <a:blip r:embed="rId8"/>
+                <a:stretch>
+                  <a:fillRect l="-10843" t="-2174" r="-18072" b="-32609"/>
+                </a:stretch>
+              </a:blipFill>
+            </p:spPr>
+            <p:txBody>
+              <a:bodyPr/>
+              <a:lstStyle/>
+              <a:p>
+                <a:r>
+                  <a:rPr lang="en-US">
+                    <a:noFill/>
+                  </a:rPr>
+                  <a:t> </a:t>
+                </a:r>
+              </a:p>
+            </p:txBody>
+          </p:sp>
+        </mc:Fallback>
+      </mc:AlternateContent>
+      <mc:AlternateContent xmlns:mc="http://schemas.openxmlformats.org/markup-compatibility/2006">
+        <mc:Choice xmlns:a14="http://schemas.microsoft.com/office/drawing/2010/main" Requires="a14">
+          <p:sp>
+            <p:nvSpPr>
+              <p:cNvPr id="80" name="Tekstfelt 79"/>
+              <p:cNvSpPr txBox="1"/>
+              <p:nvPr/>
+            </p:nvSpPr>
+            <p:spPr>
+              <a:xfrm>
+                <a:off x="4265503" y="1525969"/>
+                <a:ext cx="617990" cy="276999"/>
+              </a:xfrm>
+              <a:prstGeom prst="rect">
+                <a:avLst/>
+              </a:prstGeom>
+              <a:noFill/>
+            </p:spPr>
+            <p:txBody>
+              <a:bodyPr wrap="none" lIns="0" tIns="0" rIns="0" bIns="0" rtlCol="0">
+                <a:spAutoFit/>
+              </a:bodyPr>
+              <a:lstStyle/>
+              <a:p>
+                <a14:m>
+                  <m:oMathPara xmlns:m="http://schemas.openxmlformats.org/officeDocument/2006/math">
+                    <m:oMathParaPr>
+                      <m:jc m:val="centerGroup"/>
+                    </m:oMathParaPr>
+                    <m:oMath xmlns:m="http://schemas.openxmlformats.org/officeDocument/2006/math">
+                      <m:r>
+                        <a:rPr lang="da-DK" b="0" i="1" smtClean="0">
+                          <a:latin typeface="Cambria Math" panose="02040503050406030204" pitchFamily="18" charset="0"/>
+                        </a:rPr>
+                        <m:t>𝑃𝑊𝑀</m:t>
+                      </m:r>
+                    </m:oMath>
+                  </m:oMathPara>
+                </a14:m>
+                <a:endParaRPr lang="en-US" dirty="0"/>
+              </a:p>
+            </p:txBody>
+          </p:sp>
+        </mc:Choice>
+        <mc:Fallback>
+          <p:sp>
+            <p:nvSpPr>
+              <p:cNvPr id="80" name="Tekstfelt 79"/>
+              <p:cNvSpPr txBox="1">
+                <a:spLocks noRot="1" noChangeAspect="1" noMove="1" noResize="1" noEditPoints="1" noAdjustHandles="1" noChangeArrowheads="1" noChangeShapeType="1" noTextEdit="1"/>
+              </p:cNvSpPr>
+              <p:nvPr/>
+            </p:nvSpPr>
+            <p:spPr>
+              <a:xfrm>
+                <a:off x="4265503" y="1525969"/>
+                <a:ext cx="617990" cy="276999"/>
+              </a:xfrm>
+              <a:prstGeom prst="rect">
+                <a:avLst/>
+              </a:prstGeom>
+              <a:blipFill rotWithShape="0">
+                <a:blip r:embed="rId9"/>
+                <a:stretch>
+                  <a:fillRect l="-8911" r="-8911" b="-6522"/>
+                </a:stretch>
+              </a:blipFill>
+            </p:spPr>
+            <p:txBody>
+              <a:bodyPr/>
+              <a:lstStyle/>
+              <a:p>
+                <a:r>
+                  <a:rPr lang="en-US">
+                    <a:noFill/>
+                  </a:rPr>
+                  <a:t> </a:t>
+                </a:r>
+              </a:p>
+            </p:txBody>
+          </p:sp>
+        </mc:Fallback>
+      </mc:AlternateContent>
+      <mc:AlternateContent xmlns:mc="http://schemas.openxmlformats.org/markup-compatibility/2006">
+        <mc:Choice xmlns:a14="http://schemas.microsoft.com/office/drawing/2010/main" Requires="a14">
+          <p:sp>
+            <p:nvSpPr>
+              <p:cNvPr id="81" name="Tekstfelt 80"/>
+              <p:cNvSpPr txBox="1"/>
+              <p:nvPr/>
+            </p:nvSpPr>
+            <p:spPr>
+              <a:xfrm>
+                <a:off x="5475962" y="1514940"/>
+                <a:ext cx="567015" cy="276999"/>
+              </a:xfrm>
+              <a:prstGeom prst="rect">
+                <a:avLst/>
+              </a:prstGeom>
+              <a:noFill/>
+            </p:spPr>
+            <p:txBody>
+              <a:bodyPr wrap="none" lIns="0" tIns="0" rIns="0" bIns="0" rtlCol="0">
+                <a:spAutoFit/>
+              </a:bodyPr>
+              <a:lstStyle/>
+              <a:p>
+                <a14:m>
+                  <m:oMathPara xmlns:m="http://schemas.openxmlformats.org/officeDocument/2006/math">
+                    <m:oMathParaPr>
+                      <m:jc m:val="centerGroup"/>
+                    </m:oMathParaPr>
+                    <m:oMath xmlns:m="http://schemas.openxmlformats.org/officeDocument/2006/math">
+                      <m:sSub>
+                        <m:sSubPr>
+                          <m:ctrlPr>
+                            <a:rPr lang="da-DK" b="0" i="1" smtClean="0">
+                              <a:latin typeface="Cambria Math" panose="02040503050406030204" pitchFamily="18" charset="0"/>
+                            </a:rPr>
+                          </m:ctrlPr>
+                        </m:sSubPr>
+                        <m:e>
+                          <m:r>
+                            <a:rPr lang="da-DK" b="0" i="1" smtClean="0">
+                              <a:latin typeface="Cambria Math" panose="02040503050406030204" pitchFamily="18" charset="0"/>
+                            </a:rPr>
+                            <m:t>𝑉</m:t>
+                          </m:r>
+                        </m:e>
+                        <m:sub>
+                          <m:r>
+                            <a:rPr lang="da-DK" b="0" i="1" smtClean="0">
+                              <a:latin typeface="Cambria Math" panose="02040503050406030204" pitchFamily="18" charset="0"/>
+                            </a:rPr>
+                            <m:t>𝑎</m:t>
+                          </m:r>
+                        </m:sub>
+                      </m:sSub>
+                      <m:r>
+                        <a:rPr lang="da-DK" b="0" i="1" smtClean="0">
+                          <a:latin typeface="Cambria Math" panose="02040503050406030204" pitchFamily="18" charset="0"/>
+                        </a:rPr>
+                        <m:t>(</m:t>
+                      </m:r>
+                      <m:r>
+                        <a:rPr lang="da-DK" b="0" i="1" smtClean="0">
+                          <a:latin typeface="Cambria Math" panose="02040503050406030204" pitchFamily="18" charset="0"/>
+                        </a:rPr>
+                        <m:t>𝑠</m:t>
+                      </m:r>
+                      <m:r>
+                        <a:rPr lang="da-DK" b="0" i="1" smtClean="0">
+                          <a:latin typeface="Cambria Math" panose="02040503050406030204" pitchFamily="18" charset="0"/>
+                        </a:rPr>
+                        <m:t>)</m:t>
+                      </m:r>
+                    </m:oMath>
+                  </m:oMathPara>
+                </a14:m>
+                <a:endParaRPr lang="en-US" dirty="0"/>
+              </a:p>
+            </p:txBody>
+          </p:sp>
+        </mc:Choice>
+        <mc:Fallback>
+          <p:sp>
+            <p:nvSpPr>
+              <p:cNvPr id="81" name="Tekstfelt 80"/>
+              <p:cNvSpPr txBox="1">
+                <a:spLocks noRot="1" noChangeAspect="1" noMove="1" noResize="1" noEditPoints="1" noAdjustHandles="1" noChangeArrowheads="1" noChangeShapeType="1" noTextEdit="1"/>
+              </p:cNvSpPr>
+              <p:nvPr/>
+            </p:nvSpPr>
+            <p:spPr>
+              <a:xfrm>
+                <a:off x="5475962" y="1514940"/>
+                <a:ext cx="567015" cy="276999"/>
+              </a:xfrm>
+              <a:prstGeom prst="rect">
+                <a:avLst/>
+              </a:prstGeom>
+              <a:blipFill rotWithShape="0">
+                <a:blip r:embed="rId10"/>
+                <a:stretch>
+                  <a:fillRect l="-8602" t="-4444" r="-15054" b="-35556"/>
+                </a:stretch>
+              </a:blipFill>
+            </p:spPr>
+            <p:txBody>
+              <a:bodyPr/>
+              <a:lstStyle/>
+              <a:p>
+                <a:r>
+                  <a:rPr lang="en-US">
+                    <a:noFill/>
+                  </a:rPr>
+                  <a:t> </a:t>
+                </a:r>
+              </a:p>
+            </p:txBody>
+          </p:sp>
+        </mc:Fallback>
+      </mc:AlternateContent>
+      <mc:AlternateContent xmlns:mc="http://schemas.openxmlformats.org/markup-compatibility/2006">
+        <mc:Choice xmlns:a14="http://schemas.microsoft.com/office/drawing/2010/main" Requires="a14">
+          <p:sp>
+            <p:nvSpPr>
+              <p:cNvPr id="82" name="Tekstfelt 81"/>
+              <p:cNvSpPr txBox="1"/>
+              <p:nvPr/>
+            </p:nvSpPr>
+            <p:spPr>
+              <a:xfrm>
+                <a:off x="7478003" y="1500493"/>
+                <a:ext cx="529184" cy="276999"/>
+              </a:xfrm>
+              <a:prstGeom prst="rect">
+                <a:avLst/>
+              </a:prstGeom>
+              <a:noFill/>
+            </p:spPr>
+            <p:txBody>
+              <a:bodyPr wrap="none" lIns="0" tIns="0" rIns="0" bIns="0" rtlCol="0">
+                <a:spAutoFit/>
+              </a:bodyPr>
+              <a:lstStyle/>
+              <a:p>
+                <a14:m>
+                  <m:oMathPara xmlns:m="http://schemas.openxmlformats.org/officeDocument/2006/math">
+                    <m:oMathParaPr>
+                      <m:jc m:val="centerGroup"/>
+                    </m:oMathParaPr>
+                    <m:oMath xmlns:m="http://schemas.openxmlformats.org/officeDocument/2006/math">
+                      <m:r>
+                        <a:rPr lang="da-DK" b="0" i="1" smtClean="0">
+                          <a:latin typeface="Cambria Math" panose="02040503050406030204" pitchFamily="18" charset="0"/>
+                        </a:rPr>
+                        <m:t>𝜔</m:t>
+                      </m:r>
+                      <m:r>
+                        <a:rPr lang="da-DK" b="0" i="1" smtClean="0">
+                          <a:latin typeface="Cambria Math" panose="02040503050406030204" pitchFamily="18" charset="0"/>
+                        </a:rPr>
+                        <m:t>(</m:t>
+                      </m:r>
+                      <m:r>
+                        <a:rPr lang="da-DK" b="0" i="1" smtClean="0">
+                          <a:latin typeface="Cambria Math" panose="02040503050406030204" pitchFamily="18" charset="0"/>
+                        </a:rPr>
+                        <m:t>𝑠</m:t>
+                      </m:r>
+                      <m:r>
+                        <a:rPr lang="da-DK" b="0" i="1" smtClean="0">
+                          <a:latin typeface="Cambria Math" panose="02040503050406030204" pitchFamily="18" charset="0"/>
+                        </a:rPr>
+                        <m:t>)</m:t>
+                      </m:r>
+                    </m:oMath>
+                  </m:oMathPara>
+                </a14:m>
+                <a:endParaRPr lang="en-US" dirty="0"/>
+              </a:p>
+            </p:txBody>
+          </p:sp>
+        </mc:Choice>
+        <mc:Fallback>
+          <p:sp>
+            <p:nvSpPr>
+              <p:cNvPr id="82" name="Tekstfelt 81"/>
+              <p:cNvSpPr txBox="1">
+                <a:spLocks noRot="1" noChangeAspect="1" noMove="1" noResize="1" noEditPoints="1" noAdjustHandles="1" noChangeArrowheads="1" noChangeShapeType="1" noTextEdit="1"/>
+              </p:cNvSpPr>
+              <p:nvPr/>
+            </p:nvSpPr>
+            <p:spPr>
+              <a:xfrm>
+                <a:off x="7478003" y="1500493"/>
+                <a:ext cx="529184" cy="276999"/>
+              </a:xfrm>
+              <a:prstGeom prst="rect">
+                <a:avLst/>
+              </a:prstGeom>
+              <a:blipFill rotWithShape="0">
+                <a:blip r:embed="rId11"/>
+                <a:stretch>
+                  <a:fillRect l="-5747" t="-2174" r="-16092" b="-32609"/>
+                </a:stretch>
+              </a:blipFill>
+            </p:spPr>
+            <p:txBody>
+              <a:bodyPr/>
+              <a:lstStyle/>
+              <a:p>
+                <a:r>
+                  <a:rPr lang="en-US">
+                    <a:noFill/>
+                  </a:rPr>
+                  <a:t> </a:t>
+                </a:r>
+              </a:p>
+            </p:txBody>
+          </p:sp>
+        </mc:Fallback>
+      </mc:AlternateContent>
+      <p:sp>
+        <p:nvSpPr>
+          <p:cNvPr id="84" name="Tekstfelt 83"/>
+          <p:cNvSpPr txBox="1"/>
+          <p:nvPr/>
+        </p:nvSpPr>
+        <p:spPr>
+          <a:xfrm>
+            <a:off x="4778619" y="1961667"/>
+            <a:ext cx="834733" cy="369332"/>
+          </a:xfrm>
+          <a:prstGeom prst="rect">
+            <a:avLst/>
+          </a:prstGeom>
+          <a:noFill/>
+        </p:spPr>
+        <p:txBody>
+          <a:bodyPr wrap="square" rtlCol="0">
+            <a:spAutoFit/>
+          </a:bodyPr>
+          <a:lstStyle/>
+          <a:p>
+            <a:r>
+              <a:rPr lang="da-DK" dirty="0" smtClean="0"/>
+              <a:t>H-bro</a:t>
+            </a:r>
+            <a:endParaRPr lang="en-US" dirty="0"/>
+          </a:p>
+        </p:txBody>
+      </p:sp>
+      <p:sp>
+        <p:nvSpPr>
+          <p:cNvPr id="85" name="Tekstfelt 84"/>
+          <p:cNvSpPr txBox="1"/>
+          <p:nvPr/>
+        </p:nvSpPr>
+        <p:spPr>
+          <a:xfrm>
+            <a:off x="8261511" y="2126898"/>
+            <a:ext cx="1779376" cy="646331"/>
+          </a:xfrm>
+          <a:prstGeom prst="rect">
+            <a:avLst/>
+          </a:prstGeom>
+          <a:noFill/>
+        </p:spPr>
+        <p:txBody>
+          <a:bodyPr wrap="square" rtlCol="0">
+            <a:spAutoFit/>
+          </a:bodyPr>
+          <a:lstStyle/>
+          <a:p>
+            <a:pPr algn="ctr"/>
+            <a:r>
+              <a:rPr lang="da-DK" dirty="0" smtClean="0"/>
+              <a:t>Encoder + Positionsmodul</a:t>
+            </a:r>
+            <a:endParaRPr lang="en-US" dirty="0"/>
+          </a:p>
+        </p:txBody>
+      </p:sp>
+      <p:sp>
+        <p:nvSpPr>
+          <p:cNvPr id="103" name="Tekstfelt 102"/>
+          <p:cNvSpPr txBox="1"/>
+          <p:nvPr/>
+        </p:nvSpPr>
+        <p:spPr>
+          <a:xfrm>
+            <a:off x="3207431" y="2134127"/>
+            <a:ext cx="1135102" cy="369332"/>
+          </a:xfrm>
+          <a:prstGeom prst="rect">
+            <a:avLst/>
+          </a:prstGeom>
+          <a:noFill/>
+        </p:spPr>
+        <p:txBody>
+          <a:bodyPr wrap="square" rtlCol="0">
+            <a:spAutoFit/>
+          </a:bodyPr>
+          <a:lstStyle/>
+          <a:p>
+            <a:r>
+              <a:rPr lang="da-DK" dirty="0" smtClean="0"/>
+              <a:t>Controller</a:t>
+            </a:r>
+            <a:endParaRPr lang="en-US" dirty="0"/>
+          </a:p>
+        </p:txBody>
+      </p:sp>
+    </p:spTree>
+    <p:extLst>
+      <p:ext uri="{BB962C8B-B14F-4D97-AF65-F5344CB8AC3E}">
+        <p14:creationId xmlns:p14="http://schemas.microsoft.com/office/powerpoint/2010/main" val="2330793212"/>
       </p:ext>
     </p:extLst>
   </p:cSld>

</xml_diff>

<commit_message>
Det må vist også være det for idag.. Lidt mere om PID-implementering
</commit_message>
<xml_diff>
--- a/Documents/Rapport/Figurer/Figurer.pptx
+++ b/Documents/Rapport/Figurer/Figurer.pptx
@@ -8,6 +8,7 @@
     <p:sldId id="256" r:id="rId2"/>
     <p:sldId id="257" r:id="rId3"/>
     <p:sldId id="258" r:id="rId4"/>
+    <p:sldId id="259" r:id="rId5"/>
   </p:sldIdLst>
   <p:sldSz cx="12192000" cy="6858000"/>
   <p:notesSz cx="6858000" cy="9144000"/>
@@ -106,6 +107,11 @@
       </a:defRPr>
     </a:lvl9pPr>
   </p:defaultTextStyle>
+  <p:extLst>
+    <p:ext uri="{EFAFB233-063F-42B5-8137-9DF3F51BA10A}">
+      <p15:sldGuideLst xmlns:p15="http://schemas.microsoft.com/office/powerpoint/2012/main"/>
+    </p:ext>
+  </p:extLst>
 </p:presentation>
 </file>
 
@@ -240,7 +246,7 @@
           <a:p>
             <a:fld id="{2DB48698-B5CB-4A7C-9FBB-B33954BD56C2}" type="datetimeFigureOut">
               <a:rPr lang="en-US" smtClean="0"/>
-              <a:t>5/20/2016</a:t>
+              <a:t>5/21/2016</a:t>
             </a:fld>
             <a:endParaRPr lang="en-US"/>
           </a:p>
@@ -410,7 +416,7 @@
           <a:p>
             <a:fld id="{2DB48698-B5CB-4A7C-9FBB-B33954BD56C2}" type="datetimeFigureOut">
               <a:rPr lang="en-US" smtClean="0"/>
-              <a:t>5/20/2016</a:t>
+              <a:t>5/21/2016</a:t>
             </a:fld>
             <a:endParaRPr lang="en-US"/>
           </a:p>
@@ -590,7 +596,7 @@
           <a:p>
             <a:fld id="{2DB48698-B5CB-4A7C-9FBB-B33954BD56C2}" type="datetimeFigureOut">
               <a:rPr lang="en-US" smtClean="0"/>
-              <a:t>5/20/2016</a:t>
+              <a:t>5/21/2016</a:t>
             </a:fld>
             <a:endParaRPr lang="en-US"/>
           </a:p>
@@ -760,7 +766,7 @@
           <a:p>
             <a:fld id="{2DB48698-B5CB-4A7C-9FBB-B33954BD56C2}" type="datetimeFigureOut">
               <a:rPr lang="en-US" smtClean="0"/>
-              <a:t>5/20/2016</a:t>
+              <a:t>5/21/2016</a:t>
             </a:fld>
             <a:endParaRPr lang="en-US"/>
           </a:p>
@@ -1006,7 +1012,7 @@
           <a:p>
             <a:fld id="{2DB48698-B5CB-4A7C-9FBB-B33954BD56C2}" type="datetimeFigureOut">
               <a:rPr lang="en-US" smtClean="0"/>
-              <a:t>5/20/2016</a:t>
+              <a:t>5/21/2016</a:t>
             </a:fld>
             <a:endParaRPr lang="en-US"/>
           </a:p>
@@ -1238,7 +1244,7 @@
           <a:p>
             <a:fld id="{2DB48698-B5CB-4A7C-9FBB-B33954BD56C2}" type="datetimeFigureOut">
               <a:rPr lang="en-US" smtClean="0"/>
-              <a:t>5/20/2016</a:t>
+              <a:t>5/21/2016</a:t>
             </a:fld>
             <a:endParaRPr lang="en-US"/>
           </a:p>
@@ -1605,7 +1611,7 @@
           <a:p>
             <a:fld id="{2DB48698-B5CB-4A7C-9FBB-B33954BD56C2}" type="datetimeFigureOut">
               <a:rPr lang="en-US" smtClean="0"/>
-              <a:t>5/20/2016</a:t>
+              <a:t>5/21/2016</a:t>
             </a:fld>
             <a:endParaRPr lang="en-US"/>
           </a:p>
@@ -1723,7 +1729,7 @@
           <a:p>
             <a:fld id="{2DB48698-B5CB-4A7C-9FBB-B33954BD56C2}" type="datetimeFigureOut">
               <a:rPr lang="en-US" smtClean="0"/>
-              <a:t>5/20/2016</a:t>
+              <a:t>5/21/2016</a:t>
             </a:fld>
             <a:endParaRPr lang="en-US"/>
           </a:p>
@@ -1818,7 +1824,7 @@
           <a:p>
             <a:fld id="{2DB48698-B5CB-4A7C-9FBB-B33954BD56C2}" type="datetimeFigureOut">
               <a:rPr lang="en-US" smtClean="0"/>
-              <a:t>5/20/2016</a:t>
+              <a:t>5/21/2016</a:t>
             </a:fld>
             <a:endParaRPr lang="en-US"/>
           </a:p>
@@ -2095,7 +2101,7 @@
           <a:p>
             <a:fld id="{2DB48698-B5CB-4A7C-9FBB-B33954BD56C2}" type="datetimeFigureOut">
               <a:rPr lang="en-US" smtClean="0"/>
-              <a:t>5/20/2016</a:t>
+              <a:t>5/21/2016</a:t>
             </a:fld>
             <a:endParaRPr lang="en-US"/>
           </a:p>
@@ -2348,7 +2354,7 @@
           <a:p>
             <a:fld id="{2DB48698-B5CB-4A7C-9FBB-B33954BD56C2}" type="datetimeFigureOut">
               <a:rPr lang="en-US" smtClean="0"/>
-              <a:t>5/20/2016</a:t>
+              <a:t>5/21/2016</a:t>
             </a:fld>
             <a:endParaRPr lang="en-US"/>
           </a:p>
@@ -2561,7 +2567,7 @@
           <a:p>
             <a:fld id="{2DB48698-B5CB-4A7C-9FBB-B33954BD56C2}" type="datetimeFigureOut">
               <a:rPr lang="en-US" smtClean="0"/>
-              <a:t>5/20/2016</a:t>
+              <a:t>5/21/2016</a:t>
             </a:fld>
             <a:endParaRPr lang="en-US"/>
           </a:p>
@@ -4418,8 +4424,8 @@
           <a:chExt cx="0" cy="0"/>
         </a:xfrm>
       </p:grpSpPr>
-      <mc:AlternateContent xmlns:mc="http://schemas.openxmlformats.org/markup-compatibility/2006">
-        <mc:Choice xmlns:a14="http://schemas.microsoft.com/office/drawing/2010/main" Requires="a14">
+      <mc:AlternateContent xmlns:mc="http://schemas.openxmlformats.org/markup-compatibility/2006" xmlns:a14="http://schemas.microsoft.com/office/drawing/2010/main">
+        <mc:Choice Requires="a14">
           <p:sp>
             <p:nvSpPr>
               <p:cNvPr id="4" name="Rektangel 3"/>
@@ -4505,7 +4511,7 @@
             </p:txBody>
           </p:sp>
         </mc:Choice>
-        <mc:Fallback>
+        <mc:Fallback xmlns="">
           <p:sp>
             <p:nvSpPr>
               <p:cNvPr id="4" name="Rektangel 3"/>
@@ -4544,8 +4550,8 @@
           </p:sp>
         </mc:Fallback>
       </mc:AlternateContent>
-      <mc:AlternateContent xmlns:mc="http://schemas.openxmlformats.org/markup-compatibility/2006">
-        <mc:Choice xmlns:a14="http://schemas.microsoft.com/office/drawing/2010/main" Requires="a14">
+      <mc:AlternateContent xmlns:mc="http://schemas.openxmlformats.org/markup-compatibility/2006" xmlns:a14="http://schemas.microsoft.com/office/drawing/2010/main">
+        <mc:Choice Requires="a14">
           <p:sp>
             <p:nvSpPr>
               <p:cNvPr id="5" name="Rektangel 4"/>
@@ -4619,7 +4625,7 @@
             </p:txBody>
           </p:sp>
         </mc:Choice>
-        <mc:Fallback>
+        <mc:Fallback xmlns="">
           <p:sp>
             <p:nvSpPr>
               <p:cNvPr id="5" name="Rektangel 4"/>
@@ -5140,8 +5146,8 @@
           </a:fontRef>
         </p:style>
       </p:cxnSp>
-      <mc:AlternateContent xmlns:mc="http://schemas.openxmlformats.org/markup-compatibility/2006">
-        <mc:Choice xmlns:a14="http://schemas.microsoft.com/office/drawing/2010/main" Requires="a14">
+      <mc:AlternateContent xmlns:mc="http://schemas.openxmlformats.org/markup-compatibility/2006" xmlns:a14="http://schemas.microsoft.com/office/drawing/2010/main">
+        <mc:Choice Requires="a14">
           <p:sp>
             <p:nvSpPr>
               <p:cNvPr id="52" name="Rektangel 51"/>
@@ -5215,7 +5221,7 @@
             </p:txBody>
           </p:sp>
         </mc:Choice>
-        <mc:Fallback>
+        <mc:Fallback xmlns="">
           <p:sp>
             <p:nvSpPr>
               <p:cNvPr id="52" name="Rektangel 51"/>
@@ -5390,8 +5396,8 @@
           </a:p>
         </p:txBody>
       </p:sp>
-      <mc:AlternateContent xmlns:mc="http://schemas.openxmlformats.org/markup-compatibility/2006">
-        <mc:Choice xmlns:a14="http://schemas.microsoft.com/office/drawing/2010/main" Requires="a14">
+      <mc:AlternateContent xmlns:mc="http://schemas.openxmlformats.org/markup-compatibility/2006" xmlns:a14="http://schemas.microsoft.com/office/drawing/2010/main">
+        <mc:Choice Requires="a14">
           <p:sp>
             <p:nvSpPr>
               <p:cNvPr id="73" name="Tekstfelt 72"/>
@@ -5414,6 +5420,7 @@
               </a:bodyPr>
               <a:lstStyle/>
               <a:p>
+                <a:pPr/>
                 <a14:m>
                   <m:oMathPara xmlns:m="http://schemas.openxmlformats.org/officeDocument/2006/math">
                     <m:oMathParaPr>
@@ -5471,7 +5478,7 @@
             </p:txBody>
           </p:sp>
         </mc:Choice>
-        <mc:Fallback>
+        <mc:Fallback xmlns="">
           <p:sp>
             <p:nvSpPr>
               <p:cNvPr id="73" name="Tekstfelt 72"/>
@@ -5510,8 +5517,8 @@
           </p:sp>
         </mc:Fallback>
       </mc:AlternateContent>
-      <mc:AlternateContent xmlns:mc="http://schemas.openxmlformats.org/markup-compatibility/2006">
-        <mc:Choice xmlns:a14="http://schemas.microsoft.com/office/drawing/2010/main" Requires="a14">
+      <mc:AlternateContent xmlns:mc="http://schemas.openxmlformats.org/markup-compatibility/2006" xmlns:a14="http://schemas.microsoft.com/office/drawing/2010/main">
+        <mc:Choice Requires="a14">
           <p:sp>
             <p:nvSpPr>
               <p:cNvPr id="75" name="Tekstfelt 74"/>
@@ -5534,6 +5541,7 @@
               </a:bodyPr>
               <a:lstStyle/>
               <a:p>
+                <a:pPr/>
                 <a14:m>
                   <m:oMathPara xmlns:m="http://schemas.openxmlformats.org/officeDocument/2006/math">
                     <m:oMathParaPr>
@@ -5572,7 +5580,7 @@
             </p:txBody>
           </p:sp>
         </mc:Choice>
-        <mc:Fallback>
+        <mc:Fallback xmlns="">
           <p:sp>
             <p:nvSpPr>
               <p:cNvPr id="75" name="Tekstfelt 74"/>
@@ -5611,8 +5619,8 @@
           </p:sp>
         </mc:Fallback>
       </mc:AlternateContent>
-      <mc:AlternateContent xmlns:mc="http://schemas.openxmlformats.org/markup-compatibility/2006">
-        <mc:Choice xmlns:a14="http://schemas.microsoft.com/office/drawing/2010/main" Requires="a14">
+      <mc:AlternateContent xmlns:mc="http://schemas.openxmlformats.org/markup-compatibility/2006" xmlns:a14="http://schemas.microsoft.com/office/drawing/2010/main">
+        <mc:Choice Requires="a14">
           <p:sp>
             <p:nvSpPr>
               <p:cNvPr id="76" name="Tekstfelt 75"/>
@@ -5635,6 +5643,7 @@
               </a:bodyPr>
               <a:lstStyle/>
               <a:p>
+                <a:pPr/>
                 <a14:m>
                   <m:oMathPara xmlns:m="http://schemas.openxmlformats.org/officeDocument/2006/math">
                     <m:oMathParaPr>
@@ -5673,7 +5682,7 @@
             </p:txBody>
           </p:sp>
         </mc:Choice>
-        <mc:Fallback>
+        <mc:Fallback xmlns="">
           <p:sp>
             <p:nvSpPr>
               <p:cNvPr id="76" name="Tekstfelt 75"/>
@@ -5712,8 +5721,8 @@
           </p:sp>
         </mc:Fallback>
       </mc:AlternateContent>
-      <mc:AlternateContent xmlns:mc="http://schemas.openxmlformats.org/markup-compatibility/2006">
-        <mc:Choice xmlns:a14="http://schemas.microsoft.com/office/drawing/2010/main" Requires="a14">
+      <mc:AlternateContent xmlns:mc="http://schemas.openxmlformats.org/markup-compatibility/2006" xmlns:a14="http://schemas.microsoft.com/office/drawing/2010/main">
+        <mc:Choice Requires="a14">
           <p:sp>
             <p:nvSpPr>
               <p:cNvPr id="79" name="Tekstfelt 78"/>
@@ -5736,6 +5745,7 @@
               </a:bodyPr>
               <a:lstStyle/>
               <a:p>
+                <a:pPr/>
                 <a14:m>
                   <m:oMathPara xmlns:m="http://schemas.openxmlformats.org/officeDocument/2006/math">
                     <m:oMathParaPr>
@@ -5774,7 +5784,7 @@
             </p:txBody>
           </p:sp>
         </mc:Choice>
-        <mc:Fallback>
+        <mc:Fallback xmlns="">
           <p:sp>
             <p:nvSpPr>
               <p:cNvPr id="79" name="Tekstfelt 78"/>
@@ -5813,8 +5823,8 @@
           </p:sp>
         </mc:Fallback>
       </mc:AlternateContent>
-      <mc:AlternateContent xmlns:mc="http://schemas.openxmlformats.org/markup-compatibility/2006">
-        <mc:Choice xmlns:a14="http://schemas.microsoft.com/office/drawing/2010/main" Requires="a14">
+      <mc:AlternateContent xmlns:mc="http://schemas.openxmlformats.org/markup-compatibility/2006" xmlns:a14="http://schemas.microsoft.com/office/drawing/2010/main">
+        <mc:Choice Requires="a14">
           <p:sp>
             <p:nvSpPr>
               <p:cNvPr id="80" name="Tekstfelt 79"/>
@@ -5837,6 +5847,7 @@
               </a:bodyPr>
               <a:lstStyle/>
               <a:p>
+                <a:pPr/>
                 <a14:m>
                   <m:oMathPara xmlns:m="http://schemas.openxmlformats.org/officeDocument/2006/math">
                     <m:oMathParaPr>
@@ -5857,7 +5868,7 @@
             </p:txBody>
           </p:sp>
         </mc:Choice>
-        <mc:Fallback>
+        <mc:Fallback xmlns="">
           <p:sp>
             <p:nvSpPr>
               <p:cNvPr id="80" name="Tekstfelt 79"/>
@@ -5896,8 +5907,8 @@
           </p:sp>
         </mc:Fallback>
       </mc:AlternateContent>
-      <mc:AlternateContent xmlns:mc="http://schemas.openxmlformats.org/markup-compatibility/2006">
-        <mc:Choice xmlns:a14="http://schemas.microsoft.com/office/drawing/2010/main" Requires="a14">
+      <mc:AlternateContent xmlns:mc="http://schemas.openxmlformats.org/markup-compatibility/2006" xmlns:a14="http://schemas.microsoft.com/office/drawing/2010/main">
+        <mc:Choice Requires="a14">
           <p:sp>
             <p:nvSpPr>
               <p:cNvPr id="81" name="Tekstfelt 80"/>
@@ -5920,6 +5931,7 @@
               </a:bodyPr>
               <a:lstStyle/>
               <a:p>
+                <a:pPr/>
                 <a14:m>
                   <m:oMathPara xmlns:m="http://schemas.openxmlformats.org/officeDocument/2006/math">
                     <m:oMathParaPr>
@@ -5977,7 +5989,7 @@
             </p:txBody>
           </p:sp>
         </mc:Choice>
-        <mc:Fallback>
+        <mc:Fallback xmlns="">
           <p:sp>
             <p:nvSpPr>
               <p:cNvPr id="81" name="Tekstfelt 80"/>
@@ -6016,8 +6028,8 @@
           </p:sp>
         </mc:Fallback>
       </mc:AlternateContent>
-      <mc:AlternateContent xmlns:mc="http://schemas.openxmlformats.org/markup-compatibility/2006">
-        <mc:Choice xmlns:a14="http://schemas.microsoft.com/office/drawing/2010/main" Requires="a14">
+      <mc:AlternateContent xmlns:mc="http://schemas.openxmlformats.org/markup-compatibility/2006" xmlns:a14="http://schemas.microsoft.com/office/drawing/2010/main">
+        <mc:Choice Requires="a14">
           <p:sp>
             <p:nvSpPr>
               <p:cNvPr id="82" name="Tekstfelt 81"/>
@@ -6040,6 +6052,7 @@
               </a:bodyPr>
               <a:lstStyle/>
               <a:p>
+                <a:pPr/>
                 <a14:m>
                   <m:oMathPara xmlns:m="http://schemas.openxmlformats.org/officeDocument/2006/math">
                     <m:oMathParaPr>
@@ -6078,7 +6091,7 @@
             </p:txBody>
           </p:sp>
         </mc:Choice>
-        <mc:Fallback>
+        <mc:Fallback xmlns="">
           <p:sp>
             <p:nvSpPr>
               <p:cNvPr id="82" name="Tekstfelt 81"/>
@@ -6212,6 +6225,464 @@
     <p:extLst>
       <p:ext uri="{BB962C8B-B14F-4D97-AF65-F5344CB8AC3E}">
         <p14:creationId xmlns:p14="http://schemas.microsoft.com/office/powerpoint/2010/main" val="2330793212"/>
+      </p:ext>
+    </p:extLst>
+  </p:cSld>
+  <p:clrMapOvr>
+    <a:masterClrMapping/>
+  </p:clrMapOvr>
+</p:sld>
+</file>
+
+<file path=ppt/slides/slide4.xml><?xml version="1.0" encoding="utf-8"?>
+<p:sld xmlns:a="http://schemas.openxmlformats.org/drawingml/2006/main" xmlns:r="http://schemas.openxmlformats.org/officeDocument/2006/relationships" xmlns:p="http://schemas.openxmlformats.org/presentationml/2006/main">
+  <p:cSld>
+    <p:spTree>
+      <p:nvGrpSpPr>
+        <p:cNvPr id="1" name=""/>
+        <p:cNvGrpSpPr/>
+        <p:nvPr/>
+      </p:nvGrpSpPr>
+      <p:grpSpPr>
+        <a:xfrm>
+          <a:off x="0" y="0"/>
+          <a:ext cx="0" cy="0"/>
+          <a:chOff x="0" y="0"/>
+          <a:chExt cx="0" cy="0"/>
+        </a:xfrm>
+      </p:grpSpPr>
+      <p:sp>
+        <p:nvSpPr>
+          <p:cNvPr id="4" name="Rektangel 3"/>
+          <p:cNvSpPr/>
+          <p:nvPr/>
+        </p:nvSpPr>
+        <p:spPr>
+          <a:xfrm>
+            <a:off x="5599670" y="1556951"/>
+            <a:ext cx="263611" cy="2010032"/>
+          </a:xfrm>
+          <a:prstGeom prst="rect">
+            <a:avLst/>
+          </a:prstGeom>
+        </p:spPr>
+        <p:style>
+          <a:lnRef idx="1">
+            <a:schemeClr val="accent1"/>
+          </a:lnRef>
+          <a:fillRef idx="2">
+            <a:schemeClr val="accent1"/>
+          </a:fillRef>
+          <a:effectRef idx="1">
+            <a:schemeClr val="accent1"/>
+          </a:effectRef>
+          <a:fontRef idx="minor">
+            <a:schemeClr val="dk1"/>
+          </a:fontRef>
+        </p:style>
+        <p:txBody>
+          <a:bodyPr rtlCol="0" anchor="ctr"/>
+          <a:lstStyle/>
+          <a:p>
+            <a:pPr algn="ctr"/>
+            <a:endParaRPr lang="en-US"/>
+          </a:p>
+        </p:txBody>
+      </p:sp>
+      <p:sp>
+        <p:nvSpPr>
+          <p:cNvPr id="5" name="Rektangel 4"/>
+          <p:cNvSpPr/>
+          <p:nvPr/>
+        </p:nvSpPr>
+        <p:spPr>
+          <a:xfrm>
+            <a:off x="6446108" y="1556951"/>
+            <a:ext cx="263611" cy="2010032"/>
+          </a:xfrm>
+          <a:prstGeom prst="rect">
+            <a:avLst/>
+          </a:prstGeom>
+        </p:spPr>
+        <p:style>
+          <a:lnRef idx="1">
+            <a:schemeClr val="accent4"/>
+          </a:lnRef>
+          <a:fillRef idx="2">
+            <a:schemeClr val="accent4"/>
+          </a:fillRef>
+          <a:effectRef idx="1">
+            <a:schemeClr val="accent4"/>
+          </a:effectRef>
+          <a:fontRef idx="minor">
+            <a:schemeClr val="dk1"/>
+          </a:fontRef>
+        </p:style>
+        <p:txBody>
+          <a:bodyPr rtlCol="0" anchor="ctr"/>
+          <a:lstStyle/>
+          <a:p>
+            <a:pPr algn="ctr"/>
+            <a:endParaRPr lang="en-US"/>
+          </a:p>
+        </p:txBody>
+      </p:sp>
+      <p:cxnSp>
+        <p:nvCxnSpPr>
+          <p:cNvPr id="7" name="Lige forbindelse 6"/>
+          <p:cNvCxnSpPr/>
+          <p:nvPr/>
+        </p:nvCxnSpPr>
+        <p:spPr>
+          <a:xfrm>
+            <a:off x="6446108" y="2199501"/>
+            <a:ext cx="263611" cy="0"/>
+          </a:xfrm>
+          <a:prstGeom prst="line">
+            <a:avLst/>
+          </a:prstGeom>
+          <a:ln w="19050"/>
+        </p:spPr>
+        <p:style>
+          <a:lnRef idx="1">
+            <a:schemeClr val="dk1"/>
+          </a:lnRef>
+          <a:fillRef idx="0">
+            <a:schemeClr val="dk1"/>
+          </a:fillRef>
+          <a:effectRef idx="0">
+            <a:schemeClr val="dk1"/>
+          </a:effectRef>
+          <a:fontRef idx="minor">
+            <a:schemeClr val="tx1"/>
+          </a:fontRef>
+        </p:style>
+      </p:cxnSp>
+      <p:cxnSp>
+        <p:nvCxnSpPr>
+          <p:cNvPr id="8" name="Lige forbindelse 7"/>
+          <p:cNvCxnSpPr/>
+          <p:nvPr/>
+        </p:nvCxnSpPr>
+        <p:spPr>
+          <a:xfrm>
+            <a:off x="5599669" y="2199501"/>
+            <a:ext cx="263612" cy="0"/>
+          </a:xfrm>
+          <a:prstGeom prst="line">
+            <a:avLst/>
+          </a:prstGeom>
+          <a:ln w="19050"/>
+        </p:spPr>
+        <p:style>
+          <a:lnRef idx="1">
+            <a:schemeClr val="dk1"/>
+          </a:lnRef>
+          <a:fillRef idx="0">
+            <a:schemeClr val="dk1"/>
+          </a:fillRef>
+          <a:effectRef idx="0">
+            <a:schemeClr val="dk1"/>
+          </a:effectRef>
+          <a:fontRef idx="minor">
+            <a:schemeClr val="tx1"/>
+          </a:fontRef>
+        </p:style>
+      </p:cxnSp>
+      <p:cxnSp>
+        <p:nvCxnSpPr>
+          <p:cNvPr id="10" name="Lige pilforbindelse 9"/>
+          <p:cNvCxnSpPr/>
+          <p:nvPr/>
+        </p:nvCxnSpPr>
+        <p:spPr>
+          <a:xfrm>
+            <a:off x="6008471" y="2199501"/>
+            <a:ext cx="321790" cy="0"/>
+          </a:xfrm>
+          <a:prstGeom prst="straightConnector1">
+            <a:avLst/>
+          </a:prstGeom>
+          <a:ln w="12700">
+            <a:tailEnd type="triangle"/>
+          </a:ln>
+        </p:spPr>
+        <p:style>
+          <a:lnRef idx="3">
+            <a:schemeClr val="dk1"/>
+          </a:lnRef>
+          <a:fillRef idx="0">
+            <a:schemeClr val="dk1"/>
+          </a:fillRef>
+          <a:effectRef idx="2">
+            <a:schemeClr val="dk1"/>
+          </a:effectRef>
+          <a:fontRef idx="minor">
+            <a:schemeClr val="tx1"/>
+          </a:fontRef>
+        </p:style>
+      </p:cxnSp>
+      <p:sp>
+        <p:nvSpPr>
+          <p:cNvPr id="12" name="Tekstfelt 11"/>
+          <p:cNvSpPr txBox="1"/>
+          <p:nvPr/>
+        </p:nvSpPr>
+        <p:spPr>
+          <a:xfrm>
+            <a:off x="6154694" y="3570071"/>
+            <a:ext cx="1193457" cy="276999"/>
+          </a:xfrm>
+          <a:prstGeom prst="rect">
+            <a:avLst/>
+          </a:prstGeom>
+          <a:noFill/>
+        </p:spPr>
+        <p:txBody>
+          <a:bodyPr wrap="square" rtlCol="0">
+            <a:spAutoFit/>
+          </a:bodyPr>
+          <a:lstStyle/>
+          <a:p>
+            <a:r>
+              <a:rPr lang="da-DK" sz="1200" dirty="0" smtClean="0"/>
+              <a:t>Duty Cycle Min</a:t>
+            </a:r>
+            <a:endParaRPr lang="en-US" sz="1200" dirty="0"/>
+          </a:p>
+        </p:txBody>
+      </p:sp>
+      <p:sp>
+        <p:nvSpPr>
+          <p:cNvPr id="13" name="Tekstfelt 12"/>
+          <p:cNvSpPr txBox="1"/>
+          <p:nvPr/>
+        </p:nvSpPr>
+        <p:spPr>
+          <a:xfrm>
+            <a:off x="6154694" y="1293340"/>
+            <a:ext cx="1193457" cy="276999"/>
+          </a:xfrm>
+          <a:prstGeom prst="rect">
+            <a:avLst/>
+          </a:prstGeom>
+          <a:noFill/>
+        </p:spPr>
+        <p:txBody>
+          <a:bodyPr wrap="square" rtlCol="0">
+            <a:spAutoFit/>
+          </a:bodyPr>
+          <a:lstStyle/>
+          <a:p>
+            <a:r>
+              <a:rPr lang="da-DK" sz="1200" dirty="0" smtClean="0"/>
+              <a:t>Duty Cycle Max</a:t>
+            </a:r>
+            <a:endParaRPr lang="en-US" sz="1200" dirty="0"/>
+          </a:p>
+        </p:txBody>
+      </p:sp>
+      <p:sp>
+        <p:nvSpPr>
+          <p:cNvPr id="16" name="Tekstfelt 15"/>
+          <p:cNvSpPr txBox="1"/>
+          <p:nvPr/>
+        </p:nvSpPr>
+        <p:spPr>
+          <a:xfrm>
+            <a:off x="5265004" y="1293340"/>
+            <a:ext cx="932937" cy="276999"/>
+          </a:xfrm>
+          <a:prstGeom prst="rect">
+            <a:avLst/>
+          </a:prstGeom>
+          <a:noFill/>
+        </p:spPr>
+        <p:txBody>
+          <a:bodyPr wrap="square" rtlCol="0">
+            <a:spAutoFit/>
+          </a:bodyPr>
+          <a:lstStyle/>
+          <a:p>
+            <a:r>
+              <a:rPr lang="da-DK" sz="1200" dirty="0" smtClean="0"/>
+              <a:t>Output Max</a:t>
+            </a:r>
+            <a:endParaRPr lang="en-US" sz="1200" dirty="0"/>
+          </a:p>
+        </p:txBody>
+      </p:sp>
+      <p:sp>
+        <p:nvSpPr>
+          <p:cNvPr id="17" name="Tekstfelt 16"/>
+          <p:cNvSpPr txBox="1"/>
+          <p:nvPr/>
+        </p:nvSpPr>
+        <p:spPr>
+          <a:xfrm>
+            <a:off x="5265004" y="3570071"/>
+            <a:ext cx="932937" cy="276999"/>
+          </a:xfrm>
+          <a:prstGeom prst="rect">
+            <a:avLst/>
+          </a:prstGeom>
+          <a:noFill/>
+        </p:spPr>
+        <p:txBody>
+          <a:bodyPr wrap="square" rtlCol="0">
+            <a:spAutoFit/>
+          </a:bodyPr>
+          <a:lstStyle/>
+          <a:p>
+            <a:r>
+              <a:rPr lang="da-DK" sz="1200" dirty="0" smtClean="0"/>
+              <a:t>Output Min</a:t>
+            </a:r>
+            <a:endParaRPr lang="en-US" sz="1200" dirty="0"/>
+          </a:p>
+        </p:txBody>
+      </p:sp>
+      <mc:AlternateContent xmlns:mc="http://schemas.openxmlformats.org/markup-compatibility/2006">
+        <mc:Choice xmlns:a14="http://schemas.microsoft.com/office/drawing/2010/main" Requires="a14">
+          <p:sp>
+            <p:nvSpPr>
+              <p:cNvPr id="24" name="Tekstfelt 23"/>
+              <p:cNvSpPr txBox="1"/>
+              <p:nvPr/>
+            </p:nvSpPr>
+            <p:spPr>
+              <a:xfrm>
+                <a:off x="4594396" y="2045612"/>
+                <a:ext cx="1184188" cy="307777"/>
+              </a:xfrm>
+              <a:prstGeom prst="rect">
+                <a:avLst/>
+              </a:prstGeom>
+              <a:noFill/>
+            </p:spPr>
+            <p:txBody>
+              <a:bodyPr wrap="square" rtlCol="0">
+                <a:spAutoFit/>
+              </a:bodyPr>
+              <a:lstStyle/>
+              <a:p>
+                <a14:m>
+                  <m:oMathPara xmlns:m="http://schemas.openxmlformats.org/officeDocument/2006/math">
+                    <m:oMathParaPr>
+                      <m:jc m:val="centerGroup"/>
+                    </m:oMathParaPr>
+                    <m:oMath xmlns:m="http://schemas.openxmlformats.org/officeDocument/2006/math">
+                      <m:r>
+                        <a:rPr lang="da-DK" sz="1400" b="0" i="1" smtClean="0">
+                          <a:latin typeface="Cambria Math" panose="02040503050406030204" pitchFamily="18" charset="0"/>
+                        </a:rPr>
+                        <m:t>𝑃</m:t>
+                      </m:r>
+                      <m:r>
+                        <a:rPr lang="da-DK" sz="1400" b="0" i="1" smtClean="0">
+                          <a:latin typeface="Cambria Math" panose="02040503050406030204" pitchFamily="18" charset="0"/>
+                        </a:rPr>
+                        <m:t>+</m:t>
+                      </m:r>
+                      <m:r>
+                        <a:rPr lang="da-DK" sz="1400" b="0" i="1" smtClean="0">
+                          <a:latin typeface="Cambria Math" panose="02040503050406030204" pitchFamily="18" charset="0"/>
+                        </a:rPr>
+                        <m:t>𝐼</m:t>
+                      </m:r>
+                      <m:r>
+                        <a:rPr lang="da-DK" sz="1400" b="0" i="1" smtClean="0">
+                          <a:latin typeface="Cambria Math" panose="02040503050406030204" pitchFamily="18" charset="0"/>
+                        </a:rPr>
+                        <m:t>+</m:t>
+                      </m:r>
+                      <m:r>
+                        <a:rPr lang="da-DK" sz="1400" b="0" i="1" smtClean="0">
+                          <a:latin typeface="Cambria Math" panose="02040503050406030204" pitchFamily="18" charset="0"/>
+                        </a:rPr>
+                        <m:t>𝐷</m:t>
+                      </m:r>
+                    </m:oMath>
+                  </m:oMathPara>
+                </a14:m>
+                <a:endParaRPr lang="en-US" sz="1400" dirty="0"/>
+              </a:p>
+            </p:txBody>
+          </p:sp>
+        </mc:Choice>
+        <mc:Fallback>
+          <p:sp>
+            <p:nvSpPr>
+              <p:cNvPr id="24" name="Tekstfelt 23"/>
+              <p:cNvSpPr txBox="1">
+                <a:spLocks noRot="1" noChangeAspect="1" noMove="1" noResize="1" noEditPoints="1" noAdjustHandles="1" noChangeArrowheads="1" noChangeShapeType="1" noTextEdit="1"/>
+              </p:cNvSpPr>
+              <p:nvPr/>
+            </p:nvSpPr>
+            <p:spPr>
+              <a:xfrm>
+                <a:off x="4594396" y="2045612"/>
+                <a:ext cx="1184188" cy="307777"/>
+              </a:xfrm>
+              <a:prstGeom prst="rect">
+                <a:avLst/>
+              </a:prstGeom>
+              <a:blipFill rotWithShape="0">
+                <a:blip r:embed="rId2"/>
+                <a:stretch>
+                  <a:fillRect/>
+                </a:stretch>
+              </a:blipFill>
+            </p:spPr>
+            <p:txBody>
+              <a:bodyPr/>
+              <a:lstStyle/>
+              <a:p>
+                <a:r>
+                  <a:rPr lang="en-US">
+                    <a:noFill/>
+                  </a:rPr>
+                  <a:t> </a:t>
+                </a:r>
+              </a:p>
+            </p:txBody>
+          </p:sp>
+        </mc:Fallback>
+      </mc:AlternateContent>
+      <p:sp>
+        <p:nvSpPr>
+          <p:cNvPr id="25" name="Tekstfelt 24"/>
+          <p:cNvSpPr txBox="1"/>
+          <p:nvPr/>
+        </p:nvSpPr>
+        <p:spPr>
+          <a:xfrm>
+            <a:off x="6709719" y="2045612"/>
+            <a:ext cx="737286" cy="307777"/>
+          </a:xfrm>
+          <a:prstGeom prst="rect">
+            <a:avLst/>
+          </a:prstGeom>
+          <a:noFill/>
+        </p:spPr>
+        <p:txBody>
+          <a:bodyPr wrap="square" rtlCol="0">
+            <a:spAutoFit/>
+          </a:bodyPr>
+          <a:lstStyle/>
+          <a:p>
+            <a:r>
+              <a:rPr lang="da-DK" sz="1400" dirty="0" smtClean="0"/>
+              <a:t>DC Out</a:t>
+            </a:r>
+            <a:endParaRPr lang="en-US" sz="1400" dirty="0"/>
+          </a:p>
+        </p:txBody>
+      </p:sp>
+    </p:spTree>
+    <p:extLst>
+      <p:ext uri="{BB962C8B-B14F-4D97-AF65-F5344CB8AC3E}">
+        <p14:creationId xmlns:p14="http://schemas.microsoft.com/office/powerpoint/2010/main" val="201532892"/>
       </p:ext>
     </p:extLst>
   </p:cSld>

</xml_diff>